<commit_message>
deleting a1 crud & edits to lect 1
</commit_message>
<xml_diff>
--- a/ClassMaterials/SchemeIntro/SchemeIntro.pptx
+++ b/ClassMaterials/SchemeIntro/SchemeIntro.pptx
@@ -5,27 +5,28 @@
     <p:sldMasterId id="2147483649" r:id="rId1"/>
   </p:sldMasterIdLst>
   <p:notesMasterIdLst>
-    <p:notesMasterId r:id="rId17"/>
+    <p:notesMasterId r:id="rId18"/>
   </p:notesMasterIdLst>
   <p:handoutMasterIdLst>
-    <p:handoutMasterId r:id="rId18"/>
+    <p:handoutMasterId r:id="rId19"/>
   </p:handoutMasterIdLst>
   <p:sldIdLst>
-    <p:sldId id="256" r:id="rId2"/>
-    <p:sldId id="281" r:id="rId3"/>
-    <p:sldId id="282" r:id="rId4"/>
-    <p:sldId id="283" r:id="rId5"/>
-    <p:sldId id="325" r:id="rId6"/>
-    <p:sldId id="327" r:id="rId7"/>
-    <p:sldId id="328" r:id="rId8"/>
-    <p:sldId id="326" r:id="rId9"/>
-    <p:sldId id="286" r:id="rId10"/>
-    <p:sldId id="319" r:id="rId11"/>
-    <p:sldId id="320" r:id="rId12"/>
-    <p:sldId id="321" r:id="rId13"/>
-    <p:sldId id="289" r:id="rId14"/>
-    <p:sldId id="291" r:id="rId15"/>
-    <p:sldId id="324" r:id="rId16"/>
+    <p:sldId id="329" r:id="rId2"/>
+    <p:sldId id="256" r:id="rId3"/>
+    <p:sldId id="281" r:id="rId4"/>
+    <p:sldId id="282" r:id="rId5"/>
+    <p:sldId id="283" r:id="rId6"/>
+    <p:sldId id="325" r:id="rId7"/>
+    <p:sldId id="327" r:id="rId8"/>
+    <p:sldId id="328" r:id="rId9"/>
+    <p:sldId id="326" r:id="rId10"/>
+    <p:sldId id="286" r:id="rId11"/>
+    <p:sldId id="319" r:id="rId12"/>
+    <p:sldId id="320" r:id="rId13"/>
+    <p:sldId id="321" r:id="rId14"/>
+    <p:sldId id="289" r:id="rId15"/>
+    <p:sldId id="291" r:id="rId16"/>
+    <p:sldId id="324" r:id="rId17"/>
   </p:sldIdLst>
   <p:sldSz cx="12192000" cy="6858000"/>
   <p:notesSz cx="7315200" cy="9601200"/>
@@ -176,7 +177,7 @@
 <file path=ppt/revisionInfo.xml><?xml version="1.0" encoding="utf-8"?>
 <p1510:revInfo xmlns:a="http://schemas.openxmlformats.org/drawingml/2006/main" xmlns:r="http://schemas.openxmlformats.org/officeDocument/2006/relationships" xmlns:p1510="http://schemas.microsoft.com/office/powerpoint/2015/10/main">
   <p1510:revLst>
-    <p1510:client id="{34D85691-8283-4DA8-95FB-148144D4E4A2}" v="100" dt="2020-08-26T12:52:17.416"/>
+    <p1510:client id="{259FE265-D291-49B1-A92E-32DB1FFC2C68}" v="11" dt="2021-09-02T13:24:19.576"/>
   </p1510:revLst>
 </p1510:revInfo>
 </file>
@@ -225,6 +226,120 @@
             <pc:docMk/>
             <pc:sldMk cId="3903903070" sldId="325"/>
             <ac:spMk id="3" creationId="{00000000-0000-0000-0000-000000000000}"/>
+          </ac:spMkLst>
+        </pc:spChg>
+      </pc:sldChg>
+    </pc:docChg>
+  </pc:docChgLst>
+  <pc:docChgLst>
+    <pc:chgData name="Hewner, Mike" userId="7f3f83dd-6dfb-4127-a87f-c1714bd4fac9" providerId="ADAL" clId="{259FE265-D291-49B1-A92E-32DB1FFC2C68}"/>
+    <pc:docChg chg="addSld modSld sldOrd">
+      <pc:chgData name="Hewner, Mike" userId="7f3f83dd-6dfb-4127-a87f-c1714bd4fac9" providerId="ADAL" clId="{259FE265-D291-49B1-A92E-32DB1FFC2C68}" dt="2021-09-02T14:25:45.717" v="358" actId="20577"/>
+      <pc:docMkLst>
+        <pc:docMk/>
+      </pc:docMkLst>
+      <pc:sldChg chg="modSp mod">
+        <pc:chgData name="Hewner, Mike" userId="7f3f83dd-6dfb-4127-a87f-c1714bd4fac9" providerId="ADAL" clId="{259FE265-D291-49B1-A92E-32DB1FFC2C68}" dt="2021-09-02T13:14:35.535" v="285" actId="20577"/>
+        <pc:sldMkLst>
+          <pc:docMk/>
+          <pc:sldMk cId="0" sldId="256"/>
+        </pc:sldMkLst>
+        <pc:spChg chg="mod">
+          <ac:chgData name="Hewner, Mike" userId="7f3f83dd-6dfb-4127-a87f-c1714bd4fac9" providerId="ADAL" clId="{259FE265-D291-49B1-A92E-32DB1FFC2C68}" dt="2021-09-02T13:14:35.535" v="285" actId="20577"/>
+          <ac:spMkLst>
+            <pc:docMk/>
+            <pc:sldMk cId="0" sldId="256"/>
+            <ac:spMk id="2051" creationId="{00000000-0000-0000-0000-000000000000}"/>
+          </ac:spMkLst>
+        </pc:spChg>
+      </pc:sldChg>
+      <pc:sldChg chg="modSp mod">
+        <pc:chgData name="Hewner, Mike" userId="7f3f83dd-6dfb-4127-a87f-c1714bd4fac9" providerId="ADAL" clId="{259FE265-D291-49B1-A92E-32DB1FFC2C68}" dt="2021-09-02T14:24:20.417" v="349" actId="20577"/>
+        <pc:sldMkLst>
+          <pc:docMk/>
+          <pc:sldMk cId="0" sldId="281"/>
+        </pc:sldMkLst>
+        <pc:spChg chg="mod">
+          <ac:chgData name="Hewner, Mike" userId="7f3f83dd-6dfb-4127-a87f-c1714bd4fac9" providerId="ADAL" clId="{259FE265-D291-49B1-A92E-32DB1FFC2C68}" dt="2021-09-02T14:24:20.417" v="349" actId="20577"/>
+          <ac:spMkLst>
+            <pc:docMk/>
+            <pc:sldMk cId="0" sldId="281"/>
+            <ac:spMk id="32771" creationId="{00000000-0000-0000-0000-000000000000}"/>
+          </ac:spMkLst>
+        </pc:spChg>
+      </pc:sldChg>
+      <pc:sldChg chg="modSp">
+        <pc:chgData name="Hewner, Mike" userId="7f3f83dd-6dfb-4127-a87f-c1714bd4fac9" providerId="ADAL" clId="{259FE265-D291-49B1-A92E-32DB1FFC2C68}" dt="2021-09-02T13:24:08.175" v="346" actId="20577"/>
+        <pc:sldMkLst>
+          <pc:docMk/>
+          <pc:sldMk cId="0" sldId="282"/>
+        </pc:sldMkLst>
+        <pc:spChg chg="mod">
+          <ac:chgData name="Hewner, Mike" userId="7f3f83dd-6dfb-4127-a87f-c1714bd4fac9" providerId="ADAL" clId="{259FE265-D291-49B1-A92E-32DB1FFC2C68}" dt="2021-09-02T13:24:08.175" v="346" actId="20577"/>
+          <ac:spMkLst>
+            <pc:docMk/>
+            <pc:sldMk cId="0" sldId="282"/>
+            <ac:spMk id="33795" creationId="{00000000-0000-0000-0000-000000000000}"/>
+          </ac:spMkLst>
+        </pc:spChg>
+      </pc:sldChg>
+      <pc:sldChg chg="modSp modAnim">
+        <pc:chgData name="Hewner, Mike" userId="7f3f83dd-6dfb-4127-a87f-c1714bd4fac9" providerId="ADAL" clId="{259FE265-D291-49B1-A92E-32DB1FFC2C68}" dt="2021-09-02T13:24:19.576" v="348" actId="6549"/>
+        <pc:sldMkLst>
+          <pc:docMk/>
+          <pc:sldMk cId="0" sldId="283"/>
+        </pc:sldMkLst>
+        <pc:spChg chg="mod">
+          <ac:chgData name="Hewner, Mike" userId="7f3f83dd-6dfb-4127-a87f-c1714bd4fac9" providerId="ADAL" clId="{259FE265-D291-49B1-A92E-32DB1FFC2C68}" dt="2021-09-02T13:24:19.576" v="348" actId="6549"/>
+          <ac:spMkLst>
+            <pc:docMk/>
+            <pc:sldMk cId="0" sldId="283"/>
+            <ac:spMk id="34819" creationId="{00000000-0000-0000-0000-000000000000}"/>
+          </ac:spMkLst>
+        </pc:spChg>
+      </pc:sldChg>
+      <pc:sldChg chg="modSp mod">
+        <pc:chgData name="Hewner, Mike" userId="7f3f83dd-6dfb-4127-a87f-c1714bd4fac9" providerId="ADAL" clId="{259FE265-D291-49B1-A92E-32DB1FFC2C68}" dt="2021-09-02T14:25:45.717" v="358" actId="20577"/>
+        <pc:sldMkLst>
+          <pc:docMk/>
+          <pc:sldMk cId="408608333" sldId="326"/>
+        </pc:sldMkLst>
+        <pc:spChg chg="mod">
+          <ac:chgData name="Hewner, Mike" userId="7f3f83dd-6dfb-4127-a87f-c1714bd4fac9" providerId="ADAL" clId="{259FE265-D291-49B1-A92E-32DB1FFC2C68}" dt="2021-09-02T14:25:45.717" v="358" actId="20577"/>
+          <ac:spMkLst>
+            <pc:docMk/>
+            <pc:sldMk cId="408608333" sldId="326"/>
+            <ac:spMk id="3" creationId="{8A684F4A-22E3-4E63-A6ED-21D6DB4EACC9}"/>
+          </ac:spMkLst>
+        </pc:spChg>
+      </pc:sldChg>
+      <pc:sldChg chg="modSp mod">
+        <pc:chgData name="Hewner, Mike" userId="7f3f83dd-6dfb-4127-a87f-c1714bd4fac9" providerId="ADAL" clId="{259FE265-D291-49B1-A92E-32DB1FFC2C68}" dt="2021-09-02T14:25:19.248" v="357" actId="20577"/>
+        <pc:sldMkLst>
+          <pc:docMk/>
+          <pc:sldMk cId="656382770" sldId="328"/>
+        </pc:sldMkLst>
+        <pc:spChg chg="mod">
+          <ac:chgData name="Hewner, Mike" userId="7f3f83dd-6dfb-4127-a87f-c1714bd4fac9" providerId="ADAL" clId="{259FE265-D291-49B1-A92E-32DB1FFC2C68}" dt="2021-09-02T14:25:19.248" v="357" actId="20577"/>
+          <ac:spMkLst>
+            <pc:docMk/>
+            <pc:sldMk cId="656382770" sldId="328"/>
+            <ac:spMk id="2" creationId="{D8D9A8A5-AD40-4702-920B-4B4CA2889477}"/>
+          </ac:spMkLst>
+        </pc:spChg>
+      </pc:sldChg>
+      <pc:sldChg chg="modSp new mod ord">
+        <pc:chgData name="Hewner, Mike" userId="7f3f83dd-6dfb-4127-a87f-c1714bd4fac9" providerId="ADAL" clId="{259FE265-D291-49B1-A92E-32DB1FFC2C68}" dt="2021-09-02T13:23:12.796" v="337" actId="1076"/>
+        <pc:sldMkLst>
+          <pc:docMk/>
+          <pc:sldMk cId="885300306" sldId="329"/>
+        </pc:sldMkLst>
+        <pc:spChg chg="mod">
+          <ac:chgData name="Hewner, Mike" userId="7f3f83dd-6dfb-4127-a87f-c1714bd4fac9" providerId="ADAL" clId="{259FE265-D291-49B1-A92E-32DB1FFC2C68}" dt="2021-09-02T13:23:12.796" v="337" actId="1076"/>
+          <ac:spMkLst>
+            <pc:docMk/>
+            <pc:sldMk cId="885300306" sldId="329"/>
+            <ac:spMk id="2" creationId="{6D9A7653-104A-4684-9A52-60036E30CA87}"/>
           </ac:spMkLst>
         </pc:spChg>
       </pc:sldChg>
@@ -1058,7 +1173,7 @@
             <a:fld id="{C5B7D4F8-BAB4-41B3-BA43-7C65ACC6C01C}" type="slidenum">
               <a:rPr lang="en-US" smtClean="0"/>
               <a:pPr/>
-              <a:t>1</a:t>
+              <a:t>2</a:t>
             </a:fld>
             <a:endParaRPr lang="en-US"/>
           </a:p>
@@ -1148,7 +1263,7 @@
             <a:fld id="{C5B7D4F8-BAB4-41B3-BA43-7C65ACC6C01C}" type="slidenum">
               <a:rPr lang="en-US" smtClean="0"/>
               <a:pPr/>
-              <a:t>13</a:t>
+              <a:t>14</a:t>
             </a:fld>
             <a:endParaRPr lang="en-US"/>
           </a:p>
@@ -1238,7 +1353,7 @@
             <a:fld id="{C5B7D4F8-BAB4-41B3-BA43-7C65ACC6C01C}" type="slidenum">
               <a:rPr lang="en-US" smtClean="0"/>
               <a:pPr/>
-              <a:t>14</a:t>
+              <a:t>15</a:t>
             </a:fld>
             <a:endParaRPr lang="en-US"/>
           </a:p>
@@ -1347,7 +1462,7 @@
             <a:fld id="{C5B7D4F8-BAB4-41B3-BA43-7C65ACC6C01C}" type="slidenum">
               <a:rPr lang="en-US" smtClean="0"/>
               <a:pPr/>
-              <a:t>15</a:t>
+              <a:t>16</a:t>
             </a:fld>
             <a:endParaRPr lang="en-US"/>
           </a:p>
@@ -1437,7 +1552,7 @@
             <a:fld id="{C5B7D4F8-BAB4-41B3-BA43-7C65ACC6C01C}" type="slidenum">
               <a:rPr lang="en-US" smtClean="0"/>
               <a:pPr/>
-              <a:t>2</a:t>
+              <a:t>3</a:t>
             </a:fld>
             <a:endParaRPr lang="en-US"/>
           </a:p>
@@ -1493,7 +1608,7 @@
             <a:fld id="{040A1C0F-E840-47F7-AC63-9BA21A81B3EA}" type="slidenum">
               <a:rPr lang="en-US"/>
               <a:pPr/>
-              <a:t>3</a:t>
+              <a:t>4</a:t>
             </a:fld>
             <a:endParaRPr lang="en-US"/>
           </a:p>
@@ -1622,7 +1737,7 @@
             <a:fld id="{C5B7D4F8-BAB4-41B3-BA43-7C65ACC6C01C}" type="slidenum">
               <a:rPr lang="en-US" smtClean="0"/>
               <a:pPr/>
-              <a:t>4</a:t>
+              <a:t>5</a:t>
             </a:fld>
             <a:endParaRPr lang="en-US"/>
           </a:p>
@@ -1712,7 +1827,7 @@
             <a:fld id="{C5B7D4F8-BAB4-41B3-BA43-7C65ACC6C01C}" type="slidenum">
               <a:rPr lang="en-US" smtClean="0"/>
               <a:pPr/>
-              <a:t>5</a:t>
+              <a:t>6</a:t>
             </a:fld>
             <a:endParaRPr lang="en-US"/>
           </a:p>
@@ -1811,7 +1926,7 @@
             <a:fld id="{C5B7D4F8-BAB4-41B3-BA43-7C65ACC6C01C}" type="slidenum">
               <a:rPr lang="en-US" smtClean="0"/>
               <a:pPr/>
-              <a:t>9</a:t>
+              <a:t>10</a:t>
             </a:fld>
             <a:endParaRPr lang="en-US"/>
           </a:p>
@@ -1901,7 +2016,7 @@
             <a:fld id="{C5B7D4F8-BAB4-41B3-BA43-7C65ACC6C01C}" type="slidenum">
               <a:rPr lang="en-US" smtClean="0"/>
               <a:pPr/>
-              <a:t>10</a:t>
+              <a:t>11</a:t>
             </a:fld>
             <a:endParaRPr lang="en-US"/>
           </a:p>
@@ -2001,7 +2116,7 @@
             <a:fld id="{C5B7D4F8-BAB4-41B3-BA43-7C65ACC6C01C}" type="slidenum">
               <a:rPr lang="en-US" smtClean="0"/>
               <a:pPr/>
-              <a:t>11</a:t>
+              <a:t>12</a:t>
             </a:fld>
             <a:endParaRPr lang="en-US"/>
           </a:p>
@@ -2091,7 +2206,7 @@
             <a:fld id="{C5B7D4F8-BAB4-41B3-BA43-7C65ACC6C01C}" type="slidenum">
               <a:rPr lang="en-US" smtClean="0"/>
               <a:pPr/>
-              <a:t>12</a:t>
+              <a:t>13</a:t>
             </a:fld>
             <a:endParaRPr lang="en-US"/>
           </a:p>
@@ -5211,248 +5326,68 @@
       </p:grpSpPr>
       <p:sp>
         <p:nvSpPr>
-          <p:cNvPr id="2050" name="Rectangle 2"/>
-          <p:cNvSpPr>
-            <a:spLocks noGrp="1" noChangeArrowheads="1"/>
-          </p:cNvSpPr>
-          <p:nvPr>
-            <p:ph type="ctrTitle"/>
+          <p:cNvPr id="2" name="Title 1">
+            <a:extLst>
+              <a:ext uri="{FF2B5EF4-FFF2-40B4-BE49-F238E27FC236}">
+                <a16:creationId xmlns:a16="http://schemas.microsoft.com/office/drawing/2014/main" id="{6D9A7653-104A-4684-9A52-60036E30CA87}"/>
+              </a:ext>
+            </a:extLst>
+          </p:cNvPr>
+          <p:cNvSpPr>
+            <a:spLocks noGrp="1"/>
+          </p:cNvSpPr>
+          <p:nvPr>
+            <p:ph type="title"/>
           </p:nvPr>
         </p:nvSpPr>
         <p:spPr>
           <a:xfrm>
-            <a:off x="1905000" y="-152400"/>
-            <a:ext cx="8763000" cy="990600"/>
+            <a:off x="1447800" y="914400"/>
+            <a:ext cx="9525000" cy="1066800"/>
           </a:xfrm>
         </p:spPr>
         <p:txBody>
           <a:bodyPr/>
           <a:lstStyle/>
           <a:p>
-            <a:pPr>
-              <a:lnSpc>
-                <a:spcPct val="90000"/>
-              </a:lnSpc>
-            </a:pPr>
-            <a:r>
-              <a:rPr lang="en-US" sz="2800" dirty="0"/>
-              <a:t>CSSE 304</a:t>
-            </a:r>
-            <a:br>
-              <a:rPr lang="en-US" sz="2800" dirty="0"/>
-            </a:br>
-            <a:r>
-              <a:rPr lang="en-US" sz="2800" dirty="0"/>
-              <a:t>Programming Language Concepts</a:t>
-            </a:r>
-          </a:p>
-        </p:txBody>
-      </p:sp>
-      <p:sp>
-        <p:nvSpPr>
-          <p:cNvPr id="2051" name="Rectangle 3"/>
-          <p:cNvSpPr>
-            <a:spLocks noGrp="1" noChangeArrowheads="1"/>
-          </p:cNvSpPr>
-          <p:nvPr>
-            <p:ph type="subTitle" idx="1"/>
-          </p:nvPr>
-        </p:nvSpPr>
-        <p:spPr>
-          <a:xfrm>
-            <a:off x="76200" y="762000"/>
-            <a:ext cx="11734800" cy="4876800"/>
-          </a:xfrm>
-        </p:spPr>
+            <a:r>
+              <a:rPr lang="en-US" dirty="0"/>
+              <a:t>Please mark yourself in attendance on Moodle!</a:t>
+            </a:r>
+          </a:p>
+        </p:txBody>
+      </p:sp>
+      <p:sp>
+        <p:nvSpPr>
+          <p:cNvPr id="3" name="Content Placeholder 2">
+            <a:extLst>
+              <a:ext uri="{FF2B5EF4-FFF2-40B4-BE49-F238E27FC236}">
+                <a16:creationId xmlns:a16="http://schemas.microsoft.com/office/drawing/2014/main" id="{CEA2E9FB-F4D3-4B8E-AFD4-DAA48670EB3F}"/>
+              </a:ext>
+            </a:extLst>
+          </p:cNvPr>
+          <p:cNvSpPr>
+            <a:spLocks noGrp="1"/>
+          </p:cNvSpPr>
+          <p:nvPr>
+            <p:ph idx="1"/>
+          </p:nvPr>
+        </p:nvSpPr>
+        <p:spPr/>
         <p:txBody>
           <a:bodyPr/>
           <a:lstStyle/>
           <a:p>
-            <a:pPr>
-              <a:lnSpc>
-                <a:spcPct val="90000"/>
-              </a:lnSpc>
-            </a:pPr>
-            <a:r>
-              <a:rPr lang="en-US" sz="2000" dirty="0"/>
-              <a:t>Claude Anderson</a:t>
-            </a:r>
-            <a:br>
-              <a:rPr lang="en-US" sz="2000" dirty="0"/>
-            </a:br>
-            <a:r>
-              <a:rPr lang="en-US" sz="2000" dirty="0"/>
-              <a:t>Professor of Computer Science and Software Engineering</a:t>
-            </a:r>
-            <a:br>
-              <a:rPr lang="en-US" sz="2000" dirty="0"/>
-            </a:br>
-            <a:endParaRPr lang="en-US" sz="2000" dirty="0"/>
-          </a:p>
-          <a:p>
-            <a:pPr>
-              <a:lnSpc>
-                <a:spcPct val="90000"/>
-              </a:lnSpc>
-            </a:pPr>
-            <a:r>
-              <a:rPr lang="en-US" sz="2400" dirty="0"/>
-              <a:t>Typical virtual office hours MTWRF 1:30-3:30 (plus additional hours many days)</a:t>
-            </a:r>
-          </a:p>
-          <a:p>
-            <a:pPr>
-              <a:lnSpc>
-                <a:spcPct val="90000"/>
-              </a:lnSpc>
-            </a:pPr>
-            <a:r>
-              <a:rPr lang="en-US" sz="2400" dirty="0"/>
-              <a:t>My </a:t>
-            </a:r>
-            <a:r>
-              <a:rPr lang="en-US" sz="2400" dirty="0">
-                <a:hlinkClick r:id="rId3"/>
-              </a:rPr>
-              <a:t>weekly schedule </a:t>
-            </a:r>
-            <a:r>
-              <a:rPr lang="en-US" sz="2400" dirty="0"/>
-              <a:t>is also linked from the course Schedule Page and Moodle</a:t>
-            </a:r>
-          </a:p>
-          <a:p>
-            <a:pPr>
-              <a:lnSpc>
-                <a:spcPct val="90000"/>
-              </a:lnSpc>
-            </a:pPr>
-            <a:r>
-              <a:rPr lang="en-US" sz="2400" dirty="0">
-                <a:hlinkClick r:id="rId4"/>
-              </a:rPr>
-              <a:t>anderson@rose-hulman.edu</a:t>
-            </a:r>
-            <a:r>
-              <a:rPr lang="en-US" sz="2400" dirty="0"/>
-              <a:t>  </a:t>
-            </a:r>
-            <a:br>
-              <a:rPr lang="en-US" sz="2400" dirty="0"/>
-            </a:br>
-            <a:r>
-              <a:rPr lang="en-US" sz="2400" dirty="0">
-                <a:hlinkClick r:id="rId5"/>
-              </a:rPr>
-              <a:t>csse304-staff@rose-hulman.edu</a:t>
-            </a:r>
-            <a:endParaRPr lang="en-US" sz="2400" dirty="0"/>
-          </a:p>
-          <a:p>
-            <a:pPr>
-              <a:lnSpc>
-                <a:spcPct val="90000"/>
-              </a:lnSpc>
-            </a:pPr>
-            <a:endParaRPr lang="en-US" sz="2400" dirty="0"/>
-          </a:p>
-          <a:p>
-            <a:pPr>
-              <a:lnSpc>
-                <a:spcPct val="90000"/>
-              </a:lnSpc>
-            </a:pPr>
-            <a:r>
-              <a:rPr lang="en-US" sz="2800" b="1" dirty="0">
-                <a:solidFill>
-                  <a:srgbClr val="FFFF6D"/>
-                </a:solidFill>
-              </a:rPr>
-              <a:t>TAs for Fall, 2020: </a:t>
-            </a:r>
-            <a:r>
-              <a:rPr lang="en-US" sz="2200" dirty="0"/>
-              <a:t>Nathan Greiner, Achintya Gupta, Valerie Liu, </a:t>
-            </a:r>
-            <a:br>
-              <a:rPr lang="en-US" sz="2200"/>
-            </a:br>
-            <a:r>
-              <a:rPr lang="en-US" sz="2200"/>
-              <a:t>Andy </a:t>
-            </a:r>
-            <a:r>
-              <a:rPr lang="en-US" sz="2200" dirty="0"/>
-              <a:t>Sadler, Fisher Shen, Andrea Wynn, Michael Zhao</a:t>
-            </a:r>
-          </a:p>
-          <a:p>
-            <a:pPr>
-              <a:lnSpc>
-                <a:spcPct val="90000"/>
-              </a:lnSpc>
-              <a:spcBef>
-                <a:spcPts val="0"/>
-              </a:spcBef>
-            </a:pPr>
-            <a:br>
-              <a:rPr lang="en-US" sz="2200" b="1" dirty="0"/>
-            </a:br>
-            <a:r>
-              <a:rPr lang="en-US" sz="2400" b="1" dirty="0">
-                <a:solidFill>
-                  <a:srgbClr val="FF0000"/>
-                </a:solidFill>
-                <a:highlight>
-                  <a:srgbClr val="FFFF00"/>
-                </a:highlight>
-              </a:rPr>
-              <a:t>??? and ??? – </a:t>
-            </a:r>
-            <a:r>
-              <a:rPr lang="en-US" sz="2400" b="1" dirty="0" err="1">
-                <a:solidFill>
-                  <a:srgbClr val="FF0000"/>
-                </a:solidFill>
-                <a:highlight>
-                  <a:srgbClr val="FFFF00"/>
-                </a:highlight>
-              </a:rPr>
-              <a:t>PercopoTutors</a:t>
-            </a:r>
-            <a:r>
-              <a:rPr lang="en-US" sz="2400" b="1" dirty="0">
-                <a:solidFill>
-                  <a:srgbClr val="FF0000"/>
-                </a:solidFill>
-                <a:highlight>
-                  <a:srgbClr val="FFFF00"/>
-                </a:highlight>
-              </a:rPr>
-              <a:t> for the Learning Center</a:t>
-            </a:r>
-            <a:br>
-              <a:rPr lang="en-US" sz="2200" b="1" dirty="0">
-                <a:solidFill>
-                  <a:srgbClr val="FF0000"/>
-                </a:solidFill>
-                <a:highlight>
-                  <a:srgbClr val="FFFF00"/>
-                </a:highlight>
-              </a:rPr>
-            </a:br>
-            <a:endParaRPr lang="en-US" sz="2200" b="1" dirty="0">
-              <a:solidFill>
-                <a:srgbClr val="FF0000"/>
-              </a:solidFill>
-              <a:highlight>
-                <a:srgbClr val="FFFF00"/>
-              </a:highlight>
-            </a:endParaRPr>
+            <a:endParaRPr lang="en-US"/>
           </a:p>
         </p:txBody>
       </p:sp>
     </p:spTree>
+    <p:extLst>
+      <p:ext uri="{BB962C8B-B14F-4D97-AF65-F5344CB8AC3E}">
+        <p14:creationId xmlns:p14="http://schemas.microsoft.com/office/powerpoint/2010/main" val="885300306"/>
+      </p:ext>
+    </p:extLst>
   </p:cSld>
   <p:clrMapOvr>
     <a:masterClrMapping/>
@@ -5461,6 +5396,369 @@
 </file>
 
 <file path=ppt/slides/slide10.xml><?xml version="1.0" encoding="utf-8"?>
+<p:sld xmlns:a="http://schemas.openxmlformats.org/drawingml/2006/main" xmlns:r="http://schemas.openxmlformats.org/officeDocument/2006/relationships" xmlns:p="http://schemas.openxmlformats.org/presentationml/2006/main" showMasterPhAnim="0">
+  <p:cSld>
+    <p:spTree>
+      <p:nvGrpSpPr>
+        <p:cNvPr id="1" name=""/>
+        <p:cNvGrpSpPr/>
+        <p:nvPr/>
+      </p:nvGrpSpPr>
+      <p:grpSpPr>
+        <a:xfrm>
+          <a:off x="0" y="0"/>
+          <a:ext cx="0" cy="0"/>
+          <a:chOff x="0" y="0"/>
+          <a:chExt cx="0" cy="0"/>
+        </a:xfrm>
+      </p:grpSpPr>
+      <p:sp>
+        <p:nvSpPr>
+          <p:cNvPr id="37890" name="Rectangle 2"/>
+          <p:cNvSpPr>
+            <a:spLocks noGrp="1" noChangeArrowheads="1"/>
+          </p:cNvSpPr>
+          <p:nvPr>
+            <p:ph type="title"/>
+          </p:nvPr>
+        </p:nvSpPr>
+        <p:spPr>
+          <a:xfrm>
+            <a:off x="2286000" y="0"/>
+            <a:ext cx="7772400" cy="1066800"/>
+          </a:xfrm>
+        </p:spPr>
+        <p:txBody>
+          <a:bodyPr/>
+          <a:lstStyle/>
+          <a:p>
+            <a:r>
+              <a:rPr lang="en-US" dirty="0"/>
+              <a:t>Overview of Scheme 1</a:t>
+            </a:r>
+          </a:p>
+        </p:txBody>
+      </p:sp>
+      <p:sp>
+        <p:nvSpPr>
+          <p:cNvPr id="37891" name="Rectangle 3"/>
+          <p:cNvSpPr>
+            <a:spLocks noGrp="1" noChangeArrowheads="1"/>
+          </p:cNvSpPr>
+          <p:nvPr>
+            <p:ph type="body" idx="1"/>
+          </p:nvPr>
+        </p:nvSpPr>
+        <p:spPr>
+          <a:xfrm>
+            <a:off x="2057400" y="990600"/>
+            <a:ext cx="8382000" cy="5867400"/>
+          </a:xfrm>
+        </p:spPr>
+        <p:txBody>
+          <a:bodyPr/>
+          <a:lstStyle/>
+          <a:p>
+            <a:r>
+              <a:rPr lang="en-US" dirty="0"/>
+              <a:t>Invented in 1975 by Guy Steele and Gerald </a:t>
+            </a:r>
+            <a:r>
+              <a:rPr lang="en-US" dirty="0" err="1"/>
+              <a:t>Sussman</a:t>
+            </a:r>
+            <a:r>
+              <a:rPr lang="en-US" dirty="0"/>
+              <a:t> at MIT.</a:t>
+            </a:r>
+          </a:p>
+          <a:p>
+            <a:r>
+              <a:rPr lang="en-US" dirty="0"/>
+              <a:t>Syntax similar to LISP, semantics more like the </a:t>
+            </a:r>
+            <a:r>
+              <a:rPr lang="en-US" dirty="0" err="1"/>
+              <a:t>Algol</a:t>
+            </a:r>
+            <a:r>
+              <a:rPr lang="en-US" dirty="0"/>
+              <a:t> family (Pascal, </a:t>
+            </a:r>
+            <a:r>
+              <a:rPr lang="en-US" dirty="0" err="1"/>
+              <a:t>Ada</a:t>
+            </a:r>
+            <a:r>
+              <a:rPr lang="en-US" dirty="0"/>
+              <a:t>, C, Java …)</a:t>
+            </a:r>
+          </a:p>
+          <a:p>
+            <a:r>
+              <a:rPr lang="en-US" dirty="0"/>
+              <a:t>Expression-oriented and interactive (like Maple, Python, </a:t>
+            </a:r>
+            <a:r>
+              <a:rPr lang="en-US" dirty="0" err="1"/>
+              <a:t>MatLab</a:t>
+            </a:r>
+            <a:r>
+              <a:rPr lang="en-US" dirty="0"/>
+              <a:t>).</a:t>
+            </a:r>
+          </a:p>
+        </p:txBody>
+      </p:sp>
+    </p:spTree>
+  </p:cSld>
+  <p:clrMapOvr>
+    <a:masterClrMapping/>
+  </p:clrMapOvr>
+  <p:timing>
+    <p:tnLst>
+      <p:par>
+        <p:cTn id="1" dur="indefinite" restart="never" nodeType="tmRoot">
+          <p:childTnLst>
+            <p:seq concurrent="1" nextAc="seek">
+              <p:cTn id="2" dur="indefinite" nodeType="mainSeq">
+                <p:childTnLst>
+                  <p:par>
+                    <p:cTn id="3" fill="hold">
+                      <p:stCondLst>
+                        <p:cond delay="indefinite"/>
+                      </p:stCondLst>
+                      <p:childTnLst>
+                        <p:par>
+                          <p:cTn id="4" fill="hold">
+                            <p:stCondLst>
+                              <p:cond delay="0"/>
+                            </p:stCondLst>
+                            <p:childTnLst>
+                              <p:par>
+                                <p:cTn id="5" presetID="1" presetClass="entr" presetSubtype="0" fill="hold" grpId="0" nodeType="clickEffect">
+                                  <p:stCondLst>
+                                    <p:cond delay="0"/>
+                                  </p:stCondLst>
+                                  <p:childTnLst>
+                                    <p:set>
+                                      <p:cBhvr>
+                                        <p:cTn id="6" dur="1" fill="hold">
+                                          <p:stCondLst>
+                                            <p:cond delay="0"/>
+                                          </p:stCondLst>
+                                        </p:cTn>
+                                        <p:tgtEl>
+                                          <p:spTgt spid="37891">
+                                            <p:txEl>
+                                              <p:pRg st="0" end="0"/>
+                                            </p:txEl>
+                                          </p:spTgt>
+                                        </p:tgtEl>
+                                        <p:attrNameLst>
+                                          <p:attrName>style.visibility</p:attrName>
+                                        </p:attrNameLst>
+                                      </p:cBhvr>
+                                      <p:to>
+                                        <p:strVal val="visible"/>
+                                      </p:to>
+                                    </p:set>
+                                  </p:childTnLst>
+                                  <p:subTnLst>
+                                    <p:animClr clrSpc="rgb" dir="cw">
+                                      <p:cBhvr override="childStyle">
+                                        <p:cTn dur="1" fill="hold" display="0" masterRel="nextClick" afterEffect="1"/>
+                                        <p:tgtEl>
+                                          <p:spTgt spid="37891">
+                                            <p:txEl>
+                                              <p:pRg st="0" end="0"/>
+                                            </p:txEl>
+                                          </p:spTgt>
+                                        </p:tgtEl>
+                                        <p:attrNameLst>
+                                          <p:attrName>ppt_c</p:attrName>
+                                        </p:attrNameLst>
+                                      </p:cBhvr>
+                                      <p:to>
+                                        <a:schemeClr val="bg2"/>
+                                      </p:to>
+                                    </p:animClr>
+                                  </p:subTnLst>
+                                </p:cTn>
+                              </p:par>
+                            </p:childTnLst>
+                          </p:cTn>
+                        </p:par>
+                      </p:childTnLst>
+                    </p:cTn>
+                  </p:par>
+                  <p:par>
+                    <p:cTn id="7" fill="hold">
+                      <p:stCondLst>
+                        <p:cond delay="indefinite"/>
+                      </p:stCondLst>
+                      <p:childTnLst>
+                        <p:par>
+                          <p:cTn id="8" fill="hold">
+                            <p:stCondLst>
+                              <p:cond delay="0"/>
+                            </p:stCondLst>
+                            <p:childTnLst>
+                              <p:par>
+                                <p:cTn id="9" presetID="1" presetClass="entr" presetSubtype="0" fill="hold" grpId="0" nodeType="clickEffect">
+                                  <p:stCondLst>
+                                    <p:cond delay="0"/>
+                                  </p:stCondLst>
+                                  <p:childTnLst>
+                                    <p:set>
+                                      <p:cBhvr>
+                                        <p:cTn id="10" dur="1" fill="hold">
+                                          <p:stCondLst>
+                                            <p:cond delay="0"/>
+                                          </p:stCondLst>
+                                        </p:cTn>
+                                        <p:tgtEl>
+                                          <p:spTgt spid="37891">
+                                            <p:txEl>
+                                              <p:pRg st="1" end="1"/>
+                                            </p:txEl>
+                                          </p:spTgt>
+                                        </p:tgtEl>
+                                        <p:attrNameLst>
+                                          <p:attrName>style.visibility</p:attrName>
+                                        </p:attrNameLst>
+                                      </p:cBhvr>
+                                      <p:to>
+                                        <p:strVal val="visible"/>
+                                      </p:to>
+                                    </p:set>
+                                  </p:childTnLst>
+                                  <p:subTnLst>
+                                    <p:animClr clrSpc="rgb" dir="cw">
+                                      <p:cBhvr override="childStyle">
+                                        <p:cTn dur="1" fill="hold" display="0" masterRel="nextClick" afterEffect="1"/>
+                                        <p:tgtEl>
+                                          <p:spTgt spid="37891">
+                                            <p:txEl>
+                                              <p:pRg st="1" end="1"/>
+                                            </p:txEl>
+                                          </p:spTgt>
+                                        </p:tgtEl>
+                                        <p:attrNameLst>
+                                          <p:attrName>ppt_c</p:attrName>
+                                        </p:attrNameLst>
+                                      </p:cBhvr>
+                                      <p:to>
+                                        <a:schemeClr val="bg2"/>
+                                      </p:to>
+                                    </p:animClr>
+                                  </p:subTnLst>
+                                </p:cTn>
+                              </p:par>
+                            </p:childTnLst>
+                          </p:cTn>
+                        </p:par>
+                      </p:childTnLst>
+                    </p:cTn>
+                  </p:par>
+                  <p:par>
+                    <p:cTn id="11" fill="hold">
+                      <p:stCondLst>
+                        <p:cond delay="indefinite"/>
+                      </p:stCondLst>
+                      <p:childTnLst>
+                        <p:par>
+                          <p:cTn id="12" fill="hold">
+                            <p:stCondLst>
+                              <p:cond delay="0"/>
+                            </p:stCondLst>
+                            <p:childTnLst>
+                              <p:par>
+                                <p:cTn id="13" presetID="1" presetClass="entr" presetSubtype="0" fill="hold" grpId="0" nodeType="clickEffect">
+                                  <p:stCondLst>
+                                    <p:cond delay="0"/>
+                                  </p:stCondLst>
+                                  <p:childTnLst>
+                                    <p:set>
+                                      <p:cBhvr>
+                                        <p:cTn id="14" dur="1" fill="hold">
+                                          <p:stCondLst>
+                                            <p:cond delay="0"/>
+                                          </p:stCondLst>
+                                        </p:cTn>
+                                        <p:tgtEl>
+                                          <p:spTgt spid="37891">
+                                            <p:txEl>
+                                              <p:pRg st="2" end="2"/>
+                                            </p:txEl>
+                                          </p:spTgt>
+                                        </p:tgtEl>
+                                        <p:attrNameLst>
+                                          <p:attrName>style.visibility</p:attrName>
+                                        </p:attrNameLst>
+                                      </p:cBhvr>
+                                      <p:to>
+                                        <p:strVal val="visible"/>
+                                      </p:to>
+                                    </p:set>
+                                  </p:childTnLst>
+                                  <p:subTnLst>
+                                    <p:animClr clrSpc="rgb" dir="cw">
+                                      <p:cBhvr override="childStyle">
+                                        <p:cTn dur="1" fill="hold" display="0" masterRel="nextClick" afterEffect="1"/>
+                                        <p:tgtEl>
+                                          <p:spTgt spid="37891">
+                                            <p:txEl>
+                                              <p:pRg st="2" end="2"/>
+                                            </p:txEl>
+                                          </p:spTgt>
+                                        </p:tgtEl>
+                                        <p:attrNameLst>
+                                          <p:attrName>ppt_c</p:attrName>
+                                        </p:attrNameLst>
+                                      </p:cBhvr>
+                                      <p:to>
+                                        <a:schemeClr val="bg2"/>
+                                      </p:to>
+                                    </p:animClr>
+                                  </p:subTnLst>
+                                </p:cTn>
+                              </p:par>
+                            </p:childTnLst>
+                          </p:cTn>
+                        </p:par>
+                      </p:childTnLst>
+                    </p:cTn>
+                  </p:par>
+                </p:childTnLst>
+              </p:cTn>
+              <p:prevCondLst>
+                <p:cond evt="onPrev" delay="0">
+                  <p:tgtEl>
+                    <p:sldTgt/>
+                  </p:tgtEl>
+                </p:cond>
+              </p:prevCondLst>
+              <p:nextCondLst>
+                <p:cond evt="onNext" delay="0">
+                  <p:tgtEl>
+                    <p:sldTgt/>
+                  </p:tgtEl>
+                </p:cond>
+              </p:nextCondLst>
+            </p:seq>
+          </p:childTnLst>
+        </p:cTn>
+      </p:par>
+    </p:tnLst>
+    <p:bldLst>
+      <p:bldP spid="37891" grpId="0" build="p"/>
+    </p:bldLst>
+  </p:timing>
+</p:sld>
+</file>
+
+<file path=ppt/slides/slide11.xml><?xml version="1.0" encoding="utf-8"?>
 <p:sld xmlns:a="http://schemas.openxmlformats.org/drawingml/2006/main" xmlns:r="http://schemas.openxmlformats.org/officeDocument/2006/relationships" xmlns:p="http://schemas.openxmlformats.org/presentationml/2006/main" showMasterPhAnim="0">
   <p:cSld>
     <p:spTree>
@@ -6238,7 +6536,7 @@
 </p:sld>
 </file>
 
-<file path=ppt/slides/slide11.xml><?xml version="1.0" encoding="utf-8"?>
+<file path=ppt/slides/slide12.xml><?xml version="1.0" encoding="utf-8"?>
 <p:sld xmlns:a="http://schemas.openxmlformats.org/drawingml/2006/main" xmlns:r="http://schemas.openxmlformats.org/officeDocument/2006/relationships" xmlns:p="http://schemas.openxmlformats.org/presentationml/2006/main" showMasterPhAnim="0">
   <p:cSld>
     <p:spTree>
@@ -6876,7 +7174,7 @@
 </p:sld>
 </file>
 
-<file path=ppt/slides/slide12.xml><?xml version="1.0" encoding="utf-8"?>
+<file path=ppt/slides/slide13.xml><?xml version="1.0" encoding="utf-8"?>
 <p:sld xmlns:a="http://schemas.openxmlformats.org/drawingml/2006/main" xmlns:r="http://schemas.openxmlformats.org/officeDocument/2006/relationships" xmlns:p="http://schemas.openxmlformats.org/presentationml/2006/main" showMasterPhAnim="0">
   <p:cSld>
     <p:spTree>
@@ -7365,7 +7663,7 @@
 </p:sld>
 </file>
 
-<file path=ppt/slides/slide13.xml><?xml version="1.0" encoding="utf-8"?>
+<file path=ppt/slides/slide14.xml><?xml version="1.0" encoding="utf-8"?>
 <p:sld xmlns:a="http://schemas.openxmlformats.org/drawingml/2006/main" xmlns:r="http://schemas.openxmlformats.org/officeDocument/2006/relationships" xmlns:p="http://schemas.openxmlformats.org/presentationml/2006/main" showMasterPhAnim="0">
   <p:cSld>
     <p:spTree>
@@ -8220,7 +8518,7 @@
 </p:sld>
 </file>
 
-<file path=ppt/slides/slide14.xml><?xml version="1.0" encoding="utf-8"?>
+<file path=ppt/slides/slide15.xml><?xml version="1.0" encoding="utf-8"?>
 <p:sld xmlns:a="http://schemas.openxmlformats.org/drawingml/2006/main" xmlns:r="http://schemas.openxmlformats.org/officeDocument/2006/relationships" xmlns:p="http://schemas.openxmlformats.org/presentationml/2006/main" showMasterPhAnim="0">
   <p:cSld>
     <p:spTree>
@@ -9322,7 +9620,7 @@
 </p:sld>
 </file>
 
-<file path=ppt/slides/slide15.xml><?xml version="1.0" encoding="utf-8"?>
+<file path=ppt/slides/slide16.xml><?xml version="1.0" encoding="utf-8"?>
 <p:sld xmlns:a="http://schemas.openxmlformats.org/drawingml/2006/main" xmlns:r="http://schemas.openxmlformats.org/officeDocument/2006/relationships" xmlns:p="http://schemas.openxmlformats.org/presentationml/2006/main">
   <p:cSld>
     <p:spTree>
@@ -9579,132 +9877,245 @@
       </p:grpSpPr>
       <p:sp>
         <p:nvSpPr>
-          <p:cNvPr id="32770" name="Rectangle 2"/>
+          <p:cNvPr id="2050" name="Rectangle 2"/>
           <p:cNvSpPr>
             <a:spLocks noGrp="1" noChangeArrowheads="1"/>
           </p:cNvSpPr>
           <p:nvPr>
-            <p:ph type="title"/>
+            <p:ph type="ctrTitle"/>
           </p:nvPr>
         </p:nvSpPr>
         <p:spPr>
           <a:xfrm>
-            <a:off x="2209800" y="152400"/>
-            <a:ext cx="7772400" cy="1066800"/>
+            <a:off x="1905000" y="-152400"/>
+            <a:ext cx="8763000" cy="990600"/>
           </a:xfrm>
         </p:spPr>
         <p:txBody>
           <a:bodyPr/>
           <a:lstStyle/>
           <a:p>
-            <a:r>
-              <a:rPr lang="en-US" dirty="0"/>
-              <a:t>CSSE 304 Day 1</a:t>
-            </a:r>
-          </a:p>
-        </p:txBody>
-      </p:sp>
-      <p:sp>
-        <p:nvSpPr>
-          <p:cNvPr id="32771" name="Rectangle 3"/>
+            <a:pPr>
+              <a:lnSpc>
+                <a:spcPct val="90000"/>
+              </a:lnSpc>
+            </a:pPr>
+            <a:r>
+              <a:rPr lang="en-US" sz="2800" dirty="0"/>
+              <a:t>CSSE 304</a:t>
+            </a:r>
+            <a:br>
+              <a:rPr lang="en-US" sz="2800" dirty="0"/>
+            </a:br>
+            <a:r>
+              <a:rPr lang="en-US" sz="2800" dirty="0"/>
+              <a:t>Programming Language Concepts</a:t>
+            </a:r>
+          </a:p>
+        </p:txBody>
+      </p:sp>
+      <p:sp>
+        <p:nvSpPr>
+          <p:cNvPr id="2051" name="Rectangle 3"/>
           <p:cNvSpPr>
             <a:spLocks noGrp="1" noChangeArrowheads="1"/>
           </p:cNvSpPr>
           <p:nvPr>
-            <p:ph type="body" idx="1"/>
+            <p:ph type="subTitle" idx="1"/>
           </p:nvPr>
         </p:nvSpPr>
         <p:spPr>
           <a:xfrm>
-            <a:off x="990600" y="1295400"/>
-            <a:ext cx="10972800" cy="4191000"/>
+            <a:off x="76200" y="762000"/>
+            <a:ext cx="11734800" cy="4876800"/>
           </a:xfrm>
         </p:spPr>
         <p:txBody>
           <a:bodyPr/>
           <a:lstStyle/>
           <a:p>
-            <a:r>
-              <a:rPr lang="en-US" dirty="0"/>
-              <a:t>Pass the attendance sheet (daily)</a:t>
-            </a:r>
-          </a:p>
-          <a:p>
-            <a:pPr lvl="1"/>
-            <a:r>
-              <a:rPr lang="en-US" b="1" dirty="0"/>
-              <a:t>Today's sheet</a:t>
-            </a:r>
-            <a:r>
-              <a:rPr lang="en-US" dirty="0"/>
-              <a:t>: tell me what name you'd like to be called by me and by other students.</a:t>
-            </a:r>
-          </a:p>
-          <a:p>
-            <a:r>
-              <a:rPr lang="en-US" dirty="0"/>
-              <a:t>Brief Announcements</a:t>
-            </a:r>
-          </a:p>
-          <a:p>
-            <a:r>
-              <a:rPr lang="en-US" dirty="0"/>
-              <a:t>What's on the web?</a:t>
-            </a:r>
-          </a:p>
-          <a:p>
-            <a:r>
-              <a:rPr lang="en-US" dirty="0"/>
-              <a:t>Scheme Intro (assumes that you viewed the five videos)</a:t>
-            </a:r>
-          </a:p>
-          <a:p>
-            <a:r>
-              <a:rPr lang="en-US" dirty="0"/>
-              <a:t>Instructor/course intro: </a:t>
-            </a:r>
-            <a:r>
-              <a:rPr lang="en-US" b="1" dirty="0">
+            <a:pPr>
+              <a:lnSpc>
+                <a:spcPct val="90000"/>
+              </a:lnSpc>
+            </a:pPr>
+            <a:r>
+              <a:rPr lang="en-US" sz="2000" dirty="0"/>
+              <a:t>Michael Hewner (based on course designed by Claude Anderson)</a:t>
+            </a:r>
+            <a:br>
+              <a:rPr lang="en-US" sz="2000" dirty="0"/>
+            </a:br>
+            <a:r>
+              <a:rPr lang="en-US" sz="2000" dirty="0"/>
+              <a:t>Professor of Computer Science and Software Engineering</a:t>
+            </a:r>
+            <a:br>
+              <a:rPr lang="en-US" sz="2000" dirty="0"/>
+            </a:br>
+            <a:endParaRPr lang="en-US" sz="2000" dirty="0"/>
+          </a:p>
+          <a:p>
+            <a:pPr>
+              <a:lnSpc>
+                <a:spcPct val="90000"/>
+              </a:lnSpc>
+            </a:pPr>
+            <a:r>
+              <a:rPr lang="en-US" sz="2400" dirty="0"/>
+              <a:t>Office hours 4-5PM </a:t>
+            </a:r>
+            <a:r>
+              <a:rPr lang="en-US" sz="2400" dirty="0" err="1"/>
+              <a:t>MTThF</a:t>
+            </a:r>
+            <a:endParaRPr lang="en-US" sz="2400" dirty="0"/>
+          </a:p>
+          <a:p>
+            <a:pPr>
+              <a:lnSpc>
+                <a:spcPct val="90000"/>
+              </a:lnSpc>
+            </a:pPr>
+            <a:r>
+              <a:rPr lang="en-US" sz="2400" dirty="0">
+                <a:hlinkClick r:id="rId3"/>
+              </a:rPr>
+              <a:t>hewner@rose-hulman.edu</a:t>
+            </a:r>
+            <a:endParaRPr lang="en-US" sz="2400" dirty="0"/>
+          </a:p>
+          <a:p>
+            <a:pPr>
+              <a:lnSpc>
+                <a:spcPct val="90000"/>
+              </a:lnSpc>
+            </a:pPr>
+            <a:r>
+              <a:rPr lang="en-US" sz="2400" dirty="0"/>
+              <a:t>Post your questions on class message board!</a:t>
+            </a:r>
+          </a:p>
+          <a:p>
+            <a:pPr>
+              <a:lnSpc>
+                <a:spcPct val="90000"/>
+              </a:lnSpc>
+            </a:pPr>
+            <a:endParaRPr lang="en-US" sz="2400" dirty="0"/>
+          </a:p>
+          <a:p>
+            <a:pPr>
+              <a:lnSpc>
+                <a:spcPct val="90000"/>
+              </a:lnSpc>
+            </a:pPr>
+            <a:r>
+              <a:rPr lang="en-US" sz="2800" b="1" dirty="0">
                 <a:solidFill>
                   <a:srgbClr val="FFFF6D"/>
                 </a:solidFill>
               </a:rPr>
-              <a:t>will happen Day 3</a:t>
-            </a:r>
-          </a:p>
-          <a:p>
-            <a:pPr lvl="1"/>
-            <a:r>
-              <a:rPr lang="en-US" dirty="0"/>
-              <a:t>because we will dive into Scheme for the first  two class days.</a:t>
-            </a:r>
-          </a:p>
-          <a:p>
-            <a:r>
-              <a:rPr lang="en-US" dirty="0"/>
-              <a:t>                   </a:t>
-            </a:r>
-            <a:r>
-              <a:rPr lang="en-US" b="1" dirty="0">
+              <a:t>TAs for Fall, 2020: </a:t>
+            </a:r>
+            <a:r>
+              <a:rPr lang="en-US" sz="2200" dirty="0"/>
+              <a:t>Cade Parkhurst, Nathan Greiner, Luke McNeil, </a:t>
+            </a:r>
+            <a:br>
+              <a:rPr lang="en-US" sz="2200" dirty="0"/>
+            </a:br>
+            <a:r>
+              <a:rPr lang="en-US" sz="2200" dirty="0"/>
+              <a:t>Megan Merz, Elvis Morales </a:t>
+            </a:r>
+            <a:r>
+              <a:rPr lang="en-US" sz="2200" dirty="0" err="1"/>
+              <a:t>Campoverde</a:t>
+            </a:r>
+            <a:r>
+              <a:rPr lang="en-US" sz="2200" dirty="0"/>
+              <a:t>, Jonathan Moyers</a:t>
+            </a:r>
+          </a:p>
+          <a:p>
+            <a:pPr>
+              <a:lnSpc>
+                <a:spcPct val="90000"/>
+              </a:lnSpc>
+              <a:spcBef>
+                <a:spcPts val="0"/>
+              </a:spcBef>
+            </a:pPr>
+            <a:endParaRPr lang="en-US" sz="2200" b="1" dirty="0">
+              <a:solidFill>
+                <a:srgbClr val="FF0000"/>
+              </a:solidFill>
+              <a:highlight>
+                <a:srgbClr val="FFFF00"/>
+              </a:highlight>
+            </a:endParaRPr>
+          </a:p>
+          <a:p>
+            <a:pPr>
+              <a:lnSpc>
+                <a:spcPct val="90000"/>
+              </a:lnSpc>
+              <a:spcBef>
+                <a:spcPts val="0"/>
+              </a:spcBef>
+            </a:pPr>
+            <a:r>
+              <a:rPr lang="en-US" sz="2400" b="1" dirty="0">
                 <a:solidFill>
-                  <a:srgbClr val="D8D96B"/>
+                  <a:srgbClr val="FF0000"/>
                 </a:solidFill>
+                <a:highlight>
+                  <a:srgbClr val="FFFF00"/>
+                </a:highlight>
               </a:rPr>
-              <a:t>Scheme-a-thon</a:t>
-            </a:r>
-            <a:r>
-              <a:rPr lang="en-US" dirty="0"/>
-              <a:t>:  Days 1-12.</a:t>
-            </a:r>
-          </a:p>
-          <a:p>
-            <a:pPr lvl="1">
-              <a:buNone/>
-            </a:pPr>
-            <a:endParaRPr lang="en-US" dirty="0"/>
-          </a:p>
-          <a:p>
-            <a:endParaRPr lang="en-US" dirty="0"/>
+              <a:t> There may also be </a:t>
+            </a:r>
+            <a:r>
+              <a:rPr lang="en-US" sz="2400" b="1" dirty="0" err="1">
+                <a:solidFill>
+                  <a:srgbClr val="FF0000"/>
+                </a:solidFill>
+                <a:highlight>
+                  <a:srgbClr val="FFFF00"/>
+                </a:highlight>
+              </a:rPr>
+              <a:t>PercopoTutors</a:t>
+            </a:r>
+            <a:r>
+              <a:rPr lang="en-US" sz="2400" b="1" dirty="0">
+                <a:solidFill>
+                  <a:srgbClr val="FF0000"/>
+                </a:solidFill>
+                <a:highlight>
+                  <a:srgbClr val="FFFF00"/>
+                </a:highlight>
+              </a:rPr>
+              <a:t> for the Learning Center</a:t>
+            </a:r>
+            <a:br>
+              <a:rPr lang="en-US" sz="2200" b="1" dirty="0">
+                <a:solidFill>
+                  <a:srgbClr val="FF0000"/>
+                </a:solidFill>
+                <a:highlight>
+                  <a:srgbClr val="FFFF00"/>
+                </a:highlight>
+              </a:rPr>
+            </a:br>
+            <a:endParaRPr lang="en-US" sz="2200" b="1" dirty="0">
+              <a:solidFill>
+                <a:srgbClr val="FF0000"/>
+              </a:solidFill>
+              <a:highlight>
+                <a:srgbClr val="FFFF00"/>
+              </a:highlight>
+            </a:endParaRPr>
           </a:p>
         </p:txBody>
       </p:sp>
@@ -9735,6 +10146,139 @@
       </p:grpSpPr>
       <p:sp>
         <p:nvSpPr>
+          <p:cNvPr id="32770" name="Rectangle 2"/>
+          <p:cNvSpPr>
+            <a:spLocks noGrp="1" noChangeArrowheads="1"/>
+          </p:cNvSpPr>
+          <p:nvPr>
+            <p:ph type="title"/>
+          </p:nvPr>
+        </p:nvSpPr>
+        <p:spPr>
+          <a:xfrm>
+            <a:off x="2209800" y="152400"/>
+            <a:ext cx="7772400" cy="1066800"/>
+          </a:xfrm>
+        </p:spPr>
+        <p:txBody>
+          <a:bodyPr/>
+          <a:lstStyle/>
+          <a:p>
+            <a:r>
+              <a:rPr lang="en-US" dirty="0"/>
+              <a:t>CSSE 304 Day 1</a:t>
+            </a:r>
+          </a:p>
+        </p:txBody>
+      </p:sp>
+      <p:sp>
+        <p:nvSpPr>
+          <p:cNvPr id="32771" name="Rectangle 3"/>
+          <p:cNvSpPr>
+            <a:spLocks noGrp="1" noChangeArrowheads="1"/>
+          </p:cNvSpPr>
+          <p:nvPr>
+            <p:ph type="body" idx="1"/>
+          </p:nvPr>
+        </p:nvSpPr>
+        <p:spPr>
+          <a:xfrm>
+            <a:off x="990600" y="1295400"/>
+            <a:ext cx="10972800" cy="4191000"/>
+          </a:xfrm>
+        </p:spPr>
+        <p:txBody>
+          <a:bodyPr/>
+          <a:lstStyle/>
+          <a:p>
+            <a:r>
+              <a:rPr lang="en-US" dirty="0"/>
+              <a:t>What's on the web?</a:t>
+            </a:r>
+          </a:p>
+          <a:p>
+            <a:r>
+              <a:rPr lang="en-US" dirty="0"/>
+              <a:t>Scheme Intro (assumes that you viewed the five videos)</a:t>
+            </a:r>
+          </a:p>
+          <a:p>
+            <a:r>
+              <a:rPr lang="en-US" dirty="0"/>
+              <a:t>Instructor/course intro: </a:t>
+            </a:r>
+            <a:r>
+              <a:rPr lang="en-US" b="1" dirty="0">
+                <a:solidFill>
+                  <a:srgbClr val="FFFF6D"/>
+                </a:solidFill>
+              </a:rPr>
+              <a:t>will happen Day 3</a:t>
+            </a:r>
+          </a:p>
+          <a:p>
+            <a:pPr lvl="1"/>
+            <a:r>
+              <a:rPr lang="en-US" dirty="0"/>
+              <a:t>because we will dive into Scheme for the first  two class days.</a:t>
+            </a:r>
+          </a:p>
+          <a:p>
+            <a:r>
+              <a:rPr lang="en-US" dirty="0"/>
+              <a:t>                   </a:t>
+            </a:r>
+            <a:r>
+              <a:rPr lang="en-US" b="1" dirty="0">
+                <a:solidFill>
+                  <a:srgbClr val="D8D96B"/>
+                </a:solidFill>
+              </a:rPr>
+              <a:t>Scheme-a-thon</a:t>
+            </a:r>
+            <a:r>
+              <a:rPr lang="en-US" dirty="0"/>
+              <a:t>:  Days 1-12.</a:t>
+            </a:r>
+          </a:p>
+          <a:p>
+            <a:pPr lvl="1">
+              <a:buNone/>
+            </a:pPr>
+            <a:endParaRPr lang="en-US" dirty="0"/>
+          </a:p>
+          <a:p>
+            <a:endParaRPr lang="en-US" dirty="0"/>
+          </a:p>
+        </p:txBody>
+      </p:sp>
+    </p:spTree>
+  </p:cSld>
+  <p:clrMapOvr>
+    <a:masterClrMapping/>
+  </p:clrMapOvr>
+</p:sld>
+</file>
+
+<file path=ppt/slides/slide4.xml><?xml version="1.0" encoding="utf-8"?>
+<p:sld xmlns:a="http://schemas.openxmlformats.org/drawingml/2006/main" xmlns:r="http://schemas.openxmlformats.org/officeDocument/2006/relationships" xmlns:p="http://schemas.openxmlformats.org/presentationml/2006/main">
+  <p:cSld>
+    <p:spTree>
+      <p:nvGrpSpPr>
+        <p:cNvPr id="1" name=""/>
+        <p:cNvGrpSpPr/>
+        <p:nvPr/>
+      </p:nvGrpSpPr>
+      <p:grpSpPr>
+        <a:xfrm>
+          <a:off x="0" y="0"/>
+          <a:ext cx="0" cy="0"/>
+          <a:chOff x="0" y="0"/>
+          <a:chExt cx="0" cy="0"/>
+        </a:xfrm>
+      </p:grpSpPr>
+      <p:sp>
+        <p:nvSpPr>
           <p:cNvPr id="33794" name="Rectangle 2"/>
           <p:cNvSpPr>
             <a:spLocks noGrp="1" noChangeArrowheads="1"/>
@@ -9787,7 +10331,7 @@
             </a:pPr>
             <a:r>
               <a:rPr lang="en-US" dirty="0"/>
-              <a:t>TA lab hours begin today.</a:t>
+              <a:t>TA lab hours begin Friday.</a:t>
             </a:r>
           </a:p>
           <a:p>
@@ -10082,7 +10626,7 @@
 </p:sld>
 </file>
 
-<file path=ppt/slides/slide4.xml><?xml version="1.0" encoding="utf-8"?>
+<file path=ppt/slides/slide5.xml><?xml version="1.0" encoding="utf-8"?>
 <p:sld xmlns:a="http://schemas.openxmlformats.org/drawingml/2006/main" xmlns:r="http://schemas.openxmlformats.org/officeDocument/2006/relationships" xmlns:p="http://schemas.openxmlformats.org/presentationml/2006/main" showMasterPhAnim="0">
   <p:cSld>
     <p:spTree>
@@ -10145,47 +10689,6 @@
         <p:txBody>
           <a:bodyPr/>
           <a:lstStyle/>
-          <a:p>
-            <a:pPr>
-              <a:lnSpc>
-                <a:spcPct val="95000"/>
-              </a:lnSpc>
-              <a:spcBef>
-                <a:spcPts val="0"/>
-              </a:spcBef>
-            </a:pPr>
-            <a:r>
-              <a:rPr lang="en-US" dirty="0"/>
-              <a:t>Each Day's announcements will be in the </a:t>
-            </a:r>
-            <a:r>
-              <a:rPr lang="en-US" b="1" dirty="0">
-                <a:solidFill>
-                  <a:srgbClr val="FFFF6D"/>
-                </a:solidFill>
-              </a:rPr>
-              <a:t>announcements.html</a:t>
-            </a:r>
-            <a:r>
-              <a:rPr lang="en-US" dirty="0"/>
-              <a:t> document, linked from the Resources column of the Schedule page.</a:t>
-            </a:r>
-          </a:p>
-          <a:p>
-            <a:pPr>
-              <a:lnSpc>
-                <a:spcPct val="95000"/>
-              </a:lnSpc>
-              <a:spcBef>
-                <a:spcPts val="0"/>
-              </a:spcBef>
-            </a:pPr>
-            <a:endParaRPr lang="en-US" sz="3600" b="1" dirty="0">
-              <a:solidFill>
-                <a:srgbClr val="F896A9"/>
-              </a:solidFill>
-            </a:endParaRPr>
-          </a:p>
           <a:p>
             <a:pPr>
               <a:lnSpc>
@@ -10271,55 +10774,6 @@
                       </p:childTnLst>
                     </p:cTn>
                   </p:par>
-                  <p:par>
-                    <p:cTn id="7" fill="hold">
-                      <p:stCondLst>
-                        <p:cond delay="indefinite"/>
-                      </p:stCondLst>
-                      <p:childTnLst>
-                        <p:par>
-                          <p:cTn id="8" fill="hold">
-                            <p:stCondLst>
-                              <p:cond delay="0"/>
-                            </p:stCondLst>
-                            <p:childTnLst>
-                              <p:par>
-                                <p:cTn id="9" presetID="1" presetClass="entr" presetSubtype="0" fill="hold" grpId="0" nodeType="clickEffect">
-                                  <p:stCondLst>
-                                    <p:cond delay="0"/>
-                                  </p:stCondLst>
-                                  <p:childTnLst>
-                                    <p:set>
-                                      <p:cBhvr>
-                                        <p:cTn id="10" dur="1" fill="hold">
-                                          <p:stCondLst>
-                                            <p:cond delay="0"/>
-                                          </p:stCondLst>
-                                        </p:cTn>
-                                        <p:tgtEl>
-                                          <p:spTgt spid="34819">
-                                            <p:txEl>
-                                              <p:pRg st="2" end="2"/>
-                                            </p:txEl>
-                                          </p:spTgt>
-                                        </p:tgtEl>
-                                        <p:attrNameLst>
-                                          <p:attrName>style.visibility</p:attrName>
-                                        </p:attrNameLst>
-                                      </p:cBhvr>
-                                      <p:to>
-                                        <p:strVal val="visible"/>
-                                      </p:to>
-                                    </p:set>
-                                  </p:childTnLst>
-                                </p:cTn>
-                              </p:par>
-                            </p:childTnLst>
-                          </p:cTn>
-                        </p:par>
-                      </p:childTnLst>
-                    </p:cTn>
-                  </p:par>
                 </p:childTnLst>
               </p:cTn>
               <p:prevCondLst>
@@ -10348,7 +10802,7 @@
 </p:sld>
 </file>
 
-<file path=ppt/slides/slide5.xml><?xml version="1.0" encoding="utf-8"?>
+<file path=ppt/slides/slide6.xml><?xml version="1.0" encoding="utf-8"?>
 <p:sld xmlns:a="http://schemas.openxmlformats.org/drawingml/2006/main" xmlns:r="http://schemas.openxmlformats.org/officeDocument/2006/relationships" xmlns:p="http://schemas.openxmlformats.org/presentationml/2006/main">
   <p:cSld>
     <p:spTree>
@@ -10512,7 +10966,7 @@
 </p:sld>
 </file>
 
-<file path=ppt/slides/slide6.xml><?xml version="1.0" encoding="utf-8"?>
+<file path=ppt/slides/slide7.xml><?xml version="1.0" encoding="utf-8"?>
 <p:sld xmlns:a="http://schemas.openxmlformats.org/drawingml/2006/main" xmlns:r="http://schemas.openxmlformats.org/officeDocument/2006/relationships" xmlns:p="http://schemas.openxmlformats.org/presentationml/2006/main">
   <p:cSld>
     <p:spTree>
@@ -10679,7 +11133,7 @@
 </p:sld>
 </file>
 
-<file path=ppt/slides/slide7.xml><?xml version="1.0" encoding="utf-8"?>
+<file path=ppt/slides/slide8.xml><?xml version="1.0" encoding="utf-8"?>
 <p:sld xmlns:a="http://schemas.openxmlformats.org/drawingml/2006/main" xmlns:r="http://schemas.openxmlformats.org/officeDocument/2006/relationships" xmlns:p="http://schemas.openxmlformats.org/presentationml/2006/main">
   <p:cSld>
     <p:spTree>
@@ -10724,7 +11178,7 @@
           <a:p>
             <a:r>
               <a:rPr lang="en-US" dirty="0"/>
-              <a:t>From today’s class notes</a:t>
+              <a:t>Activity</a:t>
             </a:r>
           </a:p>
         </p:txBody>
@@ -10811,7 +11265,7 @@
 </p:sld>
 </file>
 
-<file path=ppt/slides/slide8.xml><?xml version="1.0" encoding="utf-8"?>
+<file path=ppt/slides/slide9.xml><?xml version="1.0" encoding="utf-8"?>
 <p:sld xmlns:a="http://schemas.openxmlformats.org/drawingml/2006/main" xmlns:r="http://schemas.openxmlformats.org/officeDocument/2006/relationships" xmlns:p="http://schemas.openxmlformats.org/presentationml/2006/main">
   <p:cSld>
     <p:spTree>
@@ -10901,12 +11355,6 @@
           <a:p>
             <a:r>
               <a:rPr lang="en-US" dirty="0"/>
-              <a:t>Duplicated on your class notes hand-out.</a:t>
-            </a:r>
-          </a:p>
-          <a:p>
-            <a:r>
-              <a:rPr lang="en-US" dirty="0"/>
               <a:t>Read it before tomorrow’s class; if you have questions, ask them in tomorrow’s class.</a:t>
             </a:r>
           </a:p>
@@ -10928,369 +11376,6 @@
   <p:clrMapOvr>
     <a:masterClrMapping/>
   </p:clrMapOvr>
-</p:sld>
-</file>
-
-<file path=ppt/slides/slide9.xml><?xml version="1.0" encoding="utf-8"?>
-<p:sld xmlns:a="http://schemas.openxmlformats.org/drawingml/2006/main" xmlns:r="http://schemas.openxmlformats.org/officeDocument/2006/relationships" xmlns:p="http://schemas.openxmlformats.org/presentationml/2006/main" showMasterPhAnim="0">
-  <p:cSld>
-    <p:spTree>
-      <p:nvGrpSpPr>
-        <p:cNvPr id="1" name=""/>
-        <p:cNvGrpSpPr/>
-        <p:nvPr/>
-      </p:nvGrpSpPr>
-      <p:grpSpPr>
-        <a:xfrm>
-          <a:off x="0" y="0"/>
-          <a:ext cx="0" cy="0"/>
-          <a:chOff x="0" y="0"/>
-          <a:chExt cx="0" cy="0"/>
-        </a:xfrm>
-      </p:grpSpPr>
-      <p:sp>
-        <p:nvSpPr>
-          <p:cNvPr id="37890" name="Rectangle 2"/>
-          <p:cNvSpPr>
-            <a:spLocks noGrp="1" noChangeArrowheads="1"/>
-          </p:cNvSpPr>
-          <p:nvPr>
-            <p:ph type="title"/>
-          </p:nvPr>
-        </p:nvSpPr>
-        <p:spPr>
-          <a:xfrm>
-            <a:off x="2286000" y="0"/>
-            <a:ext cx="7772400" cy="1066800"/>
-          </a:xfrm>
-        </p:spPr>
-        <p:txBody>
-          <a:bodyPr/>
-          <a:lstStyle/>
-          <a:p>
-            <a:r>
-              <a:rPr lang="en-US" dirty="0"/>
-              <a:t>Overview of Scheme 1</a:t>
-            </a:r>
-          </a:p>
-        </p:txBody>
-      </p:sp>
-      <p:sp>
-        <p:nvSpPr>
-          <p:cNvPr id="37891" name="Rectangle 3"/>
-          <p:cNvSpPr>
-            <a:spLocks noGrp="1" noChangeArrowheads="1"/>
-          </p:cNvSpPr>
-          <p:nvPr>
-            <p:ph type="body" idx="1"/>
-          </p:nvPr>
-        </p:nvSpPr>
-        <p:spPr>
-          <a:xfrm>
-            <a:off x="2057400" y="990600"/>
-            <a:ext cx="8382000" cy="5867400"/>
-          </a:xfrm>
-        </p:spPr>
-        <p:txBody>
-          <a:bodyPr/>
-          <a:lstStyle/>
-          <a:p>
-            <a:r>
-              <a:rPr lang="en-US" dirty="0"/>
-              <a:t>Invented in 1975 by Guy Steele and Gerald </a:t>
-            </a:r>
-            <a:r>
-              <a:rPr lang="en-US" dirty="0" err="1"/>
-              <a:t>Sussman</a:t>
-            </a:r>
-            <a:r>
-              <a:rPr lang="en-US" dirty="0"/>
-              <a:t> at MIT.</a:t>
-            </a:r>
-          </a:p>
-          <a:p>
-            <a:r>
-              <a:rPr lang="en-US" dirty="0"/>
-              <a:t>Syntax similar to LISP, semantics more like the </a:t>
-            </a:r>
-            <a:r>
-              <a:rPr lang="en-US" dirty="0" err="1"/>
-              <a:t>Algol</a:t>
-            </a:r>
-            <a:r>
-              <a:rPr lang="en-US" dirty="0"/>
-              <a:t> family (Pascal, </a:t>
-            </a:r>
-            <a:r>
-              <a:rPr lang="en-US" dirty="0" err="1"/>
-              <a:t>Ada</a:t>
-            </a:r>
-            <a:r>
-              <a:rPr lang="en-US" dirty="0"/>
-              <a:t>, C, Java …)</a:t>
-            </a:r>
-          </a:p>
-          <a:p>
-            <a:r>
-              <a:rPr lang="en-US" dirty="0"/>
-              <a:t>Expression-oriented and interactive (like Maple, Python, </a:t>
-            </a:r>
-            <a:r>
-              <a:rPr lang="en-US" dirty="0" err="1"/>
-              <a:t>MatLab</a:t>
-            </a:r>
-            <a:r>
-              <a:rPr lang="en-US" dirty="0"/>
-              <a:t>).</a:t>
-            </a:r>
-          </a:p>
-        </p:txBody>
-      </p:sp>
-    </p:spTree>
-  </p:cSld>
-  <p:clrMapOvr>
-    <a:masterClrMapping/>
-  </p:clrMapOvr>
-  <p:timing>
-    <p:tnLst>
-      <p:par>
-        <p:cTn id="1" dur="indefinite" restart="never" nodeType="tmRoot">
-          <p:childTnLst>
-            <p:seq concurrent="1" nextAc="seek">
-              <p:cTn id="2" dur="indefinite" nodeType="mainSeq">
-                <p:childTnLst>
-                  <p:par>
-                    <p:cTn id="3" fill="hold">
-                      <p:stCondLst>
-                        <p:cond delay="indefinite"/>
-                      </p:stCondLst>
-                      <p:childTnLst>
-                        <p:par>
-                          <p:cTn id="4" fill="hold">
-                            <p:stCondLst>
-                              <p:cond delay="0"/>
-                            </p:stCondLst>
-                            <p:childTnLst>
-                              <p:par>
-                                <p:cTn id="5" presetID="1" presetClass="entr" presetSubtype="0" fill="hold" grpId="0" nodeType="clickEffect">
-                                  <p:stCondLst>
-                                    <p:cond delay="0"/>
-                                  </p:stCondLst>
-                                  <p:childTnLst>
-                                    <p:set>
-                                      <p:cBhvr>
-                                        <p:cTn id="6" dur="1" fill="hold">
-                                          <p:stCondLst>
-                                            <p:cond delay="0"/>
-                                          </p:stCondLst>
-                                        </p:cTn>
-                                        <p:tgtEl>
-                                          <p:spTgt spid="37891">
-                                            <p:txEl>
-                                              <p:pRg st="0" end="0"/>
-                                            </p:txEl>
-                                          </p:spTgt>
-                                        </p:tgtEl>
-                                        <p:attrNameLst>
-                                          <p:attrName>style.visibility</p:attrName>
-                                        </p:attrNameLst>
-                                      </p:cBhvr>
-                                      <p:to>
-                                        <p:strVal val="visible"/>
-                                      </p:to>
-                                    </p:set>
-                                  </p:childTnLst>
-                                  <p:subTnLst>
-                                    <p:animClr clrSpc="rgb" dir="cw">
-                                      <p:cBhvr override="childStyle">
-                                        <p:cTn dur="1" fill="hold" display="0" masterRel="nextClick" afterEffect="1"/>
-                                        <p:tgtEl>
-                                          <p:spTgt spid="37891">
-                                            <p:txEl>
-                                              <p:pRg st="0" end="0"/>
-                                            </p:txEl>
-                                          </p:spTgt>
-                                        </p:tgtEl>
-                                        <p:attrNameLst>
-                                          <p:attrName>ppt_c</p:attrName>
-                                        </p:attrNameLst>
-                                      </p:cBhvr>
-                                      <p:to>
-                                        <a:schemeClr val="bg2"/>
-                                      </p:to>
-                                    </p:animClr>
-                                  </p:subTnLst>
-                                </p:cTn>
-                              </p:par>
-                            </p:childTnLst>
-                          </p:cTn>
-                        </p:par>
-                      </p:childTnLst>
-                    </p:cTn>
-                  </p:par>
-                  <p:par>
-                    <p:cTn id="7" fill="hold">
-                      <p:stCondLst>
-                        <p:cond delay="indefinite"/>
-                      </p:stCondLst>
-                      <p:childTnLst>
-                        <p:par>
-                          <p:cTn id="8" fill="hold">
-                            <p:stCondLst>
-                              <p:cond delay="0"/>
-                            </p:stCondLst>
-                            <p:childTnLst>
-                              <p:par>
-                                <p:cTn id="9" presetID="1" presetClass="entr" presetSubtype="0" fill="hold" grpId="0" nodeType="clickEffect">
-                                  <p:stCondLst>
-                                    <p:cond delay="0"/>
-                                  </p:stCondLst>
-                                  <p:childTnLst>
-                                    <p:set>
-                                      <p:cBhvr>
-                                        <p:cTn id="10" dur="1" fill="hold">
-                                          <p:stCondLst>
-                                            <p:cond delay="0"/>
-                                          </p:stCondLst>
-                                        </p:cTn>
-                                        <p:tgtEl>
-                                          <p:spTgt spid="37891">
-                                            <p:txEl>
-                                              <p:pRg st="1" end="1"/>
-                                            </p:txEl>
-                                          </p:spTgt>
-                                        </p:tgtEl>
-                                        <p:attrNameLst>
-                                          <p:attrName>style.visibility</p:attrName>
-                                        </p:attrNameLst>
-                                      </p:cBhvr>
-                                      <p:to>
-                                        <p:strVal val="visible"/>
-                                      </p:to>
-                                    </p:set>
-                                  </p:childTnLst>
-                                  <p:subTnLst>
-                                    <p:animClr clrSpc="rgb" dir="cw">
-                                      <p:cBhvr override="childStyle">
-                                        <p:cTn dur="1" fill="hold" display="0" masterRel="nextClick" afterEffect="1"/>
-                                        <p:tgtEl>
-                                          <p:spTgt spid="37891">
-                                            <p:txEl>
-                                              <p:pRg st="1" end="1"/>
-                                            </p:txEl>
-                                          </p:spTgt>
-                                        </p:tgtEl>
-                                        <p:attrNameLst>
-                                          <p:attrName>ppt_c</p:attrName>
-                                        </p:attrNameLst>
-                                      </p:cBhvr>
-                                      <p:to>
-                                        <a:schemeClr val="bg2"/>
-                                      </p:to>
-                                    </p:animClr>
-                                  </p:subTnLst>
-                                </p:cTn>
-                              </p:par>
-                            </p:childTnLst>
-                          </p:cTn>
-                        </p:par>
-                      </p:childTnLst>
-                    </p:cTn>
-                  </p:par>
-                  <p:par>
-                    <p:cTn id="11" fill="hold">
-                      <p:stCondLst>
-                        <p:cond delay="indefinite"/>
-                      </p:stCondLst>
-                      <p:childTnLst>
-                        <p:par>
-                          <p:cTn id="12" fill="hold">
-                            <p:stCondLst>
-                              <p:cond delay="0"/>
-                            </p:stCondLst>
-                            <p:childTnLst>
-                              <p:par>
-                                <p:cTn id="13" presetID="1" presetClass="entr" presetSubtype="0" fill="hold" grpId="0" nodeType="clickEffect">
-                                  <p:stCondLst>
-                                    <p:cond delay="0"/>
-                                  </p:stCondLst>
-                                  <p:childTnLst>
-                                    <p:set>
-                                      <p:cBhvr>
-                                        <p:cTn id="14" dur="1" fill="hold">
-                                          <p:stCondLst>
-                                            <p:cond delay="0"/>
-                                          </p:stCondLst>
-                                        </p:cTn>
-                                        <p:tgtEl>
-                                          <p:spTgt spid="37891">
-                                            <p:txEl>
-                                              <p:pRg st="2" end="2"/>
-                                            </p:txEl>
-                                          </p:spTgt>
-                                        </p:tgtEl>
-                                        <p:attrNameLst>
-                                          <p:attrName>style.visibility</p:attrName>
-                                        </p:attrNameLst>
-                                      </p:cBhvr>
-                                      <p:to>
-                                        <p:strVal val="visible"/>
-                                      </p:to>
-                                    </p:set>
-                                  </p:childTnLst>
-                                  <p:subTnLst>
-                                    <p:animClr clrSpc="rgb" dir="cw">
-                                      <p:cBhvr override="childStyle">
-                                        <p:cTn dur="1" fill="hold" display="0" masterRel="nextClick" afterEffect="1"/>
-                                        <p:tgtEl>
-                                          <p:spTgt spid="37891">
-                                            <p:txEl>
-                                              <p:pRg st="2" end="2"/>
-                                            </p:txEl>
-                                          </p:spTgt>
-                                        </p:tgtEl>
-                                        <p:attrNameLst>
-                                          <p:attrName>ppt_c</p:attrName>
-                                        </p:attrNameLst>
-                                      </p:cBhvr>
-                                      <p:to>
-                                        <a:schemeClr val="bg2"/>
-                                      </p:to>
-                                    </p:animClr>
-                                  </p:subTnLst>
-                                </p:cTn>
-                              </p:par>
-                            </p:childTnLst>
-                          </p:cTn>
-                        </p:par>
-                      </p:childTnLst>
-                    </p:cTn>
-                  </p:par>
-                </p:childTnLst>
-              </p:cTn>
-              <p:prevCondLst>
-                <p:cond evt="onPrev" delay="0">
-                  <p:tgtEl>
-                    <p:sldTgt/>
-                  </p:tgtEl>
-                </p:cond>
-              </p:prevCondLst>
-              <p:nextCondLst>
-                <p:cond evt="onNext" delay="0">
-                  <p:tgtEl>
-                    <p:sldTgt/>
-                  </p:tgtEl>
-                </p:cond>
-              </p:nextCondLst>
-            </p:seq>
-          </p:childTnLst>
-        </p:cTn>
-      </p:par>
-    </p:tnLst>
-    <p:bldLst>
-      <p:bldP spid="37891" grpId="0" build="p"/>
-    </p:bldLst>
-  </p:timing>
 </p:sld>
 </file>
 

</xml_diff>

<commit_message>
update for using trace
</commit_message>
<xml_diff>
--- a/ClassMaterials/SchemeIntro/SchemeIntro.pptx
+++ b/ClassMaterials/SchemeIntro/SchemeIntro.pptx
@@ -174,16 +174,32 @@
 </p:presentation>
 </file>
 
-<file path=ppt/revisionInfo.xml><?xml version="1.0" encoding="utf-8"?>
-<p1510:revInfo xmlns:a="http://schemas.openxmlformats.org/drawingml/2006/main" xmlns:r="http://schemas.openxmlformats.org/officeDocument/2006/relationships" xmlns:p1510="http://schemas.microsoft.com/office/powerpoint/2015/10/main">
-  <p1510:revLst>
-    <p1510:client id="{259FE265-D291-49B1-A92E-32DB1FFC2C68}" v="11" dt="2021-09-02T13:24:19.576"/>
-  </p1510:revLst>
-</p1510:revInfo>
-</file>
-
 <file path=ppt/changesInfos/changesInfo1.xml><?xml version="1.0" encoding="utf-8"?>
 <pc:chgInfo xmlns:a="http://schemas.openxmlformats.org/drawingml/2006/main" xmlns:r="http://schemas.openxmlformats.org/officeDocument/2006/relationships" xmlns:ac="http://schemas.microsoft.com/office/drawing/2013/main/command" xmlns:pc="http://schemas.microsoft.com/office/powerpoint/2013/main/command">
+  <pc:docChgLst>
+    <pc:chgData name="Hewner, Mike" userId="7f3f83dd-6dfb-4127-a87f-c1714bd4fac9" providerId="ADAL" clId="{BF3C0B4A-057F-4E1A-9500-77E2DFCE148E}"/>
+    <pc:docChg chg="modSld">
+      <pc:chgData name="Hewner, Mike" userId="7f3f83dd-6dfb-4127-a87f-c1714bd4fac9" providerId="ADAL" clId="{BF3C0B4A-057F-4E1A-9500-77E2DFCE148E}" dt="2021-11-29T14:01:38.614" v="0" actId="20577"/>
+      <pc:docMkLst>
+        <pc:docMk/>
+      </pc:docMkLst>
+      <pc:sldChg chg="modSp mod">
+        <pc:chgData name="Hewner, Mike" userId="7f3f83dd-6dfb-4127-a87f-c1714bd4fac9" providerId="ADAL" clId="{BF3C0B4A-057F-4E1A-9500-77E2DFCE148E}" dt="2021-11-29T14:01:38.614" v="0" actId="20577"/>
+        <pc:sldMkLst>
+          <pc:docMk/>
+          <pc:sldMk cId="0" sldId="256"/>
+        </pc:sldMkLst>
+        <pc:spChg chg="mod">
+          <ac:chgData name="Hewner, Mike" userId="7f3f83dd-6dfb-4127-a87f-c1714bd4fac9" providerId="ADAL" clId="{BF3C0B4A-057F-4E1A-9500-77E2DFCE148E}" dt="2021-11-29T14:01:38.614" v="0" actId="20577"/>
+          <ac:spMkLst>
+            <pc:docMk/>
+            <pc:sldMk cId="0" sldId="256"/>
+            <ac:spMk id="2051" creationId="{00000000-0000-0000-0000-000000000000}"/>
+          </ac:spMkLst>
+        </pc:spChg>
+      </pc:sldChg>
+    </pc:docChg>
+  </pc:docChgLst>
   <pc:docChgLst>
     <pc:chgData name="Anderson, Claude" userId="a89c5a5f-62c2-479f-83f1-e87c52628400" providerId="ADAL" clId="{34D85691-8283-4DA8-95FB-148144D4E4A2}"/>
     <pc:docChg chg="modSld">
@@ -10003,40 +10019,6 @@
               </a:lnSpc>
             </a:pPr>
             <a:endParaRPr lang="en-US" sz="2400" dirty="0"/>
-          </a:p>
-          <a:p>
-            <a:pPr>
-              <a:lnSpc>
-                <a:spcPct val="90000"/>
-              </a:lnSpc>
-            </a:pPr>
-            <a:r>
-              <a:rPr lang="en-US" sz="2800" b="1" dirty="0">
-                <a:solidFill>
-                  <a:srgbClr val="FFFF6D"/>
-                </a:solidFill>
-              </a:rPr>
-              <a:t>TAs for Fall, 2020: </a:t>
-            </a:r>
-            <a:r>
-              <a:rPr lang="en-US" sz="2200" dirty="0"/>
-              <a:t>Cade Parkhurst, Nathan Greiner, Luke McNeil, </a:t>
-            </a:r>
-            <a:br>
-              <a:rPr lang="en-US" sz="2200" dirty="0"/>
-            </a:br>
-            <a:r>
-              <a:rPr lang="en-US" sz="2200" dirty="0"/>
-              <a:t>Megan Merz, Elvis Morales </a:t>
-            </a:r>
-            <a:r>
-              <a:rPr lang="en-US" sz="2200" dirty="0" err="1"/>
-              <a:t>Campoverde</a:t>
-            </a:r>
-            <a:r>
-              <a:rPr lang="en-US" sz="2200" dirty="0"/>
-              <a:t>, Jonathan Moyers</a:t>
-            </a:r>
           </a:p>
           <a:p>
             <a:pPr>

</xml_diff>

<commit_message>
tweaks for day 1
</commit_message>
<xml_diff>
--- a/ClassMaterials/SchemeIntro/SchemeIntro.pptx
+++ b/ClassMaterials/SchemeIntro/SchemeIntro.pptx
@@ -5,27 +5,28 @@
     <p:sldMasterId id="2147483649" r:id="rId1"/>
   </p:sldMasterIdLst>
   <p:notesMasterIdLst>
-    <p:notesMasterId r:id="rId17"/>
+    <p:notesMasterId r:id="rId18"/>
   </p:notesMasterIdLst>
   <p:handoutMasterIdLst>
-    <p:handoutMasterId r:id="rId18"/>
+    <p:handoutMasterId r:id="rId19"/>
   </p:handoutMasterIdLst>
   <p:sldIdLst>
-    <p:sldId id="256" r:id="rId2"/>
-    <p:sldId id="281" r:id="rId3"/>
-    <p:sldId id="330" r:id="rId4"/>
-    <p:sldId id="325" r:id="rId5"/>
-    <p:sldId id="329" r:id="rId6"/>
-    <p:sldId id="327" r:id="rId7"/>
-    <p:sldId id="328" r:id="rId8"/>
-    <p:sldId id="326" r:id="rId9"/>
-    <p:sldId id="286" r:id="rId10"/>
-    <p:sldId id="319" r:id="rId11"/>
-    <p:sldId id="320" r:id="rId12"/>
-    <p:sldId id="321" r:id="rId13"/>
-    <p:sldId id="289" r:id="rId14"/>
-    <p:sldId id="291" r:id="rId15"/>
-    <p:sldId id="324" r:id="rId16"/>
+    <p:sldId id="331" r:id="rId2"/>
+    <p:sldId id="256" r:id="rId3"/>
+    <p:sldId id="281" r:id="rId4"/>
+    <p:sldId id="330" r:id="rId5"/>
+    <p:sldId id="325" r:id="rId6"/>
+    <p:sldId id="329" r:id="rId7"/>
+    <p:sldId id="327" r:id="rId8"/>
+    <p:sldId id="328" r:id="rId9"/>
+    <p:sldId id="326" r:id="rId10"/>
+    <p:sldId id="286" r:id="rId11"/>
+    <p:sldId id="319" r:id="rId12"/>
+    <p:sldId id="320" r:id="rId13"/>
+    <p:sldId id="321" r:id="rId14"/>
+    <p:sldId id="289" r:id="rId15"/>
+    <p:sldId id="291" r:id="rId16"/>
+    <p:sldId id="324" r:id="rId17"/>
   </p:sldIdLst>
   <p:sldSz cx="12192000" cy="6858000"/>
   <p:notesSz cx="7315200" cy="9601200"/>
@@ -176,7 +177,7 @@
 <file path=ppt/revisionInfo.xml><?xml version="1.0" encoding="utf-8"?>
 <p1510:revInfo xmlns:a="http://schemas.openxmlformats.org/drawingml/2006/main" xmlns:r="http://schemas.openxmlformats.org/officeDocument/2006/relationships" xmlns:p1510="http://schemas.microsoft.com/office/powerpoint/2015/10/main">
   <p1510:revLst>
-    <p1510:client id="{9A50D904-46ED-4D7B-A16B-4FD3E01D4087}" v="5" dt="2022-09-01T13:26:42.404"/>
+    <p1510:client id="{21B8B0EB-ADC9-42B4-8945-0E21CE45F3BE}" v="1" dt="2022-11-28T15:22:35.403"/>
   </p1510:revLst>
 </p1510:revInfo>
 </file>
@@ -266,6 +267,67 @@
             <ac:spMk id="3" creationId="{00000000-0000-0000-0000-000000000000}"/>
           </ac:spMkLst>
         </pc:spChg>
+      </pc:sldChg>
+    </pc:docChg>
+  </pc:docChgLst>
+  <pc:docChgLst>
+    <pc:chgData name="Hewner, Mike" userId="7f3f83dd-6dfb-4127-a87f-c1714bd4fac9" providerId="ADAL" clId="{21B8B0EB-ADC9-42B4-8945-0E21CE45F3BE}"/>
+    <pc:docChg chg="undo custSel addSld modSld sldOrd">
+      <pc:chgData name="Hewner, Mike" userId="7f3f83dd-6dfb-4127-a87f-c1714bd4fac9" providerId="ADAL" clId="{21B8B0EB-ADC9-42B4-8945-0E21CE45F3BE}" dt="2022-11-28T15:22:35.403" v="15"/>
+      <pc:docMkLst>
+        <pc:docMk/>
+      </pc:docMkLst>
+      <pc:sldChg chg="modSp mod">
+        <pc:chgData name="Hewner, Mike" userId="7f3f83dd-6dfb-4127-a87f-c1714bd4fac9" providerId="ADAL" clId="{21B8B0EB-ADC9-42B4-8945-0E21CE45F3BE}" dt="2022-11-28T15:22:12.472" v="11" actId="403"/>
+        <pc:sldMkLst>
+          <pc:docMk/>
+          <pc:sldMk cId="0" sldId="256"/>
+        </pc:sldMkLst>
+        <pc:spChg chg="mod">
+          <ac:chgData name="Hewner, Mike" userId="7f3f83dd-6dfb-4127-a87f-c1714bd4fac9" providerId="ADAL" clId="{21B8B0EB-ADC9-42B4-8945-0E21CE45F3BE}" dt="2022-11-28T15:22:12.472" v="11" actId="403"/>
+          <ac:spMkLst>
+            <pc:docMk/>
+            <pc:sldMk cId="0" sldId="256"/>
+            <ac:spMk id="2050" creationId="{00000000-0000-0000-0000-000000000000}"/>
+          </ac:spMkLst>
+        </pc:spChg>
+        <pc:spChg chg="mod">
+          <ac:chgData name="Hewner, Mike" userId="7f3f83dd-6dfb-4127-a87f-c1714bd4fac9" providerId="ADAL" clId="{21B8B0EB-ADC9-42B4-8945-0E21CE45F3BE}" dt="2022-11-28T15:22:04.395" v="6" actId="14100"/>
+          <ac:spMkLst>
+            <pc:docMk/>
+            <pc:sldMk cId="0" sldId="256"/>
+            <ac:spMk id="2051" creationId="{00000000-0000-0000-0000-000000000000}"/>
+          </ac:spMkLst>
+        </pc:spChg>
+      </pc:sldChg>
+      <pc:sldChg chg="ord">
+        <pc:chgData name="Hewner, Mike" userId="7f3f83dd-6dfb-4127-a87f-c1714bd4fac9" providerId="ADAL" clId="{21B8B0EB-ADC9-42B4-8945-0E21CE45F3BE}" dt="2022-11-28T15:22:29.926" v="14" actId="20578"/>
+        <pc:sldMkLst>
+          <pc:docMk/>
+          <pc:sldMk cId="656382770" sldId="328"/>
+        </pc:sldMkLst>
+      </pc:sldChg>
+      <pc:sldChg chg="modSp mod">
+        <pc:chgData name="Hewner, Mike" userId="7f3f83dd-6dfb-4127-a87f-c1714bd4fac9" providerId="ADAL" clId="{21B8B0EB-ADC9-42B4-8945-0E21CE45F3BE}" dt="2022-11-28T15:20:52.195" v="4" actId="6549"/>
+        <pc:sldMkLst>
+          <pc:docMk/>
+          <pc:sldMk cId="3380691754" sldId="329"/>
+        </pc:sldMkLst>
+        <pc:spChg chg="mod">
+          <ac:chgData name="Hewner, Mike" userId="7f3f83dd-6dfb-4127-a87f-c1714bd4fac9" providerId="ADAL" clId="{21B8B0EB-ADC9-42B4-8945-0E21CE45F3BE}" dt="2022-11-28T15:20:52.195" v="4" actId="6549"/>
+          <ac:spMkLst>
+            <pc:docMk/>
+            <pc:sldMk cId="3380691754" sldId="329"/>
+            <ac:spMk id="3" creationId="{FE257B81-512A-FF17-64D6-DBD229EEF213}"/>
+          </ac:spMkLst>
+        </pc:spChg>
+      </pc:sldChg>
+      <pc:sldChg chg="add">
+        <pc:chgData name="Hewner, Mike" userId="7f3f83dd-6dfb-4127-a87f-c1714bd4fac9" providerId="ADAL" clId="{21B8B0EB-ADC9-42B4-8945-0E21CE45F3BE}" dt="2022-11-28T15:22:35.403" v="15"/>
+        <pc:sldMkLst>
+          <pc:docMk/>
+          <pc:sldMk cId="1726035955" sldId="331"/>
+        </pc:sldMkLst>
       </pc:sldChg>
     </pc:docChg>
   </pc:docChgLst>
@@ -1325,7 +1387,7 @@
             <a:fld id="{C5B7D4F8-BAB4-41B3-BA43-7C65ACC6C01C}" type="slidenum">
               <a:rPr lang="en-US" smtClean="0"/>
               <a:pPr/>
-              <a:t>1</a:t>
+              <a:t>2</a:t>
             </a:fld>
             <a:endParaRPr lang="en-US"/>
           </a:p>
@@ -1434,7 +1496,7 @@
             <a:fld id="{C5B7D4F8-BAB4-41B3-BA43-7C65ACC6C01C}" type="slidenum">
               <a:rPr lang="en-US" smtClean="0"/>
               <a:pPr/>
-              <a:t>15</a:t>
+              <a:t>16</a:t>
             </a:fld>
             <a:endParaRPr lang="en-US"/>
           </a:p>
@@ -1524,7 +1586,7 @@
             <a:fld id="{C5B7D4F8-BAB4-41B3-BA43-7C65ACC6C01C}" type="slidenum">
               <a:rPr lang="en-US" smtClean="0"/>
               <a:pPr/>
-              <a:t>2</a:t>
+              <a:t>3</a:t>
             </a:fld>
             <a:endParaRPr lang="en-US"/>
           </a:p>
@@ -1614,7 +1676,7 @@
             <a:fld id="{C5B7D4F8-BAB4-41B3-BA43-7C65ACC6C01C}" type="slidenum">
               <a:rPr lang="en-US" smtClean="0"/>
               <a:pPr/>
-              <a:t>4</a:t>
+              <a:t>5</a:t>
             </a:fld>
             <a:endParaRPr lang="en-US"/>
           </a:p>
@@ -1713,7 +1775,7 @@
             <a:fld id="{C5B7D4F8-BAB4-41B3-BA43-7C65ACC6C01C}" type="slidenum">
               <a:rPr lang="en-US" smtClean="0"/>
               <a:pPr/>
-              <a:t>9</a:t>
+              <a:t>10</a:t>
             </a:fld>
             <a:endParaRPr lang="en-US"/>
           </a:p>
@@ -1803,7 +1865,7 @@
             <a:fld id="{C5B7D4F8-BAB4-41B3-BA43-7C65ACC6C01C}" type="slidenum">
               <a:rPr lang="en-US" smtClean="0"/>
               <a:pPr/>
-              <a:t>10</a:t>
+              <a:t>11</a:t>
             </a:fld>
             <a:endParaRPr lang="en-US"/>
           </a:p>
@@ -1903,7 +1965,7 @@
             <a:fld id="{C5B7D4F8-BAB4-41B3-BA43-7C65ACC6C01C}" type="slidenum">
               <a:rPr lang="en-US" smtClean="0"/>
               <a:pPr/>
-              <a:t>11</a:t>
+              <a:t>12</a:t>
             </a:fld>
             <a:endParaRPr lang="en-US"/>
           </a:p>
@@ -1993,7 +2055,7 @@
             <a:fld id="{C5B7D4F8-BAB4-41B3-BA43-7C65ACC6C01C}" type="slidenum">
               <a:rPr lang="en-US" smtClean="0"/>
               <a:pPr/>
-              <a:t>12</a:t>
+              <a:t>13</a:t>
             </a:fld>
             <a:endParaRPr lang="en-US"/>
           </a:p>
@@ -2083,7 +2145,7 @@
             <a:fld id="{C5B7D4F8-BAB4-41B3-BA43-7C65ACC6C01C}" type="slidenum">
               <a:rPr lang="en-US" smtClean="0"/>
               <a:pPr/>
-              <a:t>13</a:t>
+              <a:t>14</a:t>
             </a:fld>
             <a:endParaRPr lang="en-US"/>
           </a:p>
@@ -2173,7 +2235,7 @@
             <a:fld id="{C5B7D4F8-BAB4-41B3-BA43-7C65ACC6C01C}" type="slidenum">
               <a:rPr lang="en-US" smtClean="0"/>
               <a:pPr/>
-              <a:t>14</a:t>
+              <a:t>15</a:t>
             </a:fld>
             <a:endParaRPr lang="en-US"/>
           </a:p>
@@ -5293,150 +5355,112 @@
       </p:grpSpPr>
       <p:sp>
         <p:nvSpPr>
-          <p:cNvPr id="2050" name="Rectangle 2"/>
-          <p:cNvSpPr>
-            <a:spLocks noGrp="1" noChangeArrowheads="1"/>
-          </p:cNvSpPr>
-          <p:nvPr>
-            <p:ph type="ctrTitle"/>
+          <p:cNvPr id="2" name="Title 1">
+            <a:extLst>
+              <a:ext uri="{FF2B5EF4-FFF2-40B4-BE49-F238E27FC236}">
+                <a16:creationId xmlns:a16="http://schemas.microsoft.com/office/drawing/2014/main" id="{D8D9A8A5-AD40-4702-920B-4B4CA2889477}"/>
+              </a:ext>
+            </a:extLst>
+          </p:cNvPr>
+          <p:cNvSpPr>
+            <a:spLocks noGrp="1"/>
+          </p:cNvSpPr>
+          <p:nvPr>
+            <p:ph type="title"/>
           </p:nvPr>
         </p:nvSpPr>
         <p:spPr>
           <a:xfrm>
-            <a:off x="1905000" y="-152400"/>
-            <a:ext cx="8763000" cy="990600"/>
+            <a:off x="914400" y="76200"/>
+            <a:ext cx="10363200" cy="1066800"/>
           </a:xfrm>
         </p:spPr>
         <p:txBody>
           <a:bodyPr/>
           <a:lstStyle/>
           <a:p>
-            <a:pPr>
-              <a:lnSpc>
-                <a:spcPct val="90000"/>
-              </a:lnSpc>
-            </a:pPr>
-            <a:r>
-              <a:rPr lang="en-US" sz="2800" dirty="0"/>
-              <a:t>CSSE 304</a:t>
-            </a:r>
-            <a:br>
-              <a:rPr lang="en-US" sz="2800" dirty="0"/>
-            </a:br>
-            <a:r>
-              <a:rPr lang="en-US" sz="2800" dirty="0"/>
-              <a:t>Programming Language Concepts</a:t>
-            </a:r>
-          </a:p>
-        </p:txBody>
-      </p:sp>
-      <p:sp>
-        <p:nvSpPr>
-          <p:cNvPr id="2051" name="Rectangle 3"/>
-          <p:cNvSpPr>
-            <a:spLocks noGrp="1" noChangeArrowheads="1"/>
-          </p:cNvSpPr>
-          <p:nvPr>
-            <p:ph type="subTitle" idx="1"/>
+            <a:r>
+              <a:rPr lang="en-US" dirty="0"/>
+              <a:t>Activity</a:t>
+            </a:r>
+          </a:p>
+        </p:txBody>
+      </p:sp>
+      <p:sp>
+        <p:nvSpPr>
+          <p:cNvPr id="3" name="Content Placeholder 2">
+            <a:extLst>
+              <a:ext uri="{FF2B5EF4-FFF2-40B4-BE49-F238E27FC236}">
+                <a16:creationId xmlns:a16="http://schemas.microsoft.com/office/drawing/2014/main" id="{D3EF5107-883D-4781-BC54-A65231DB9697}"/>
+              </a:ext>
+            </a:extLst>
+          </p:cNvPr>
+          <p:cNvSpPr>
+            <a:spLocks noGrp="1"/>
+          </p:cNvSpPr>
+          <p:nvPr>
+            <p:ph idx="1"/>
           </p:nvPr>
         </p:nvSpPr>
         <p:spPr>
           <a:xfrm>
-            <a:off x="76200" y="762000"/>
-            <a:ext cx="11734800" cy="4876800"/>
+            <a:off x="938212" y="990600"/>
+            <a:ext cx="10363200" cy="1233488"/>
           </a:xfrm>
         </p:spPr>
         <p:txBody>
           <a:bodyPr/>
           <a:lstStyle/>
           <a:p>
-            <a:pPr>
-              <a:lnSpc>
-                <a:spcPct val="90000"/>
-              </a:lnSpc>
-            </a:pPr>
-            <a:r>
-              <a:rPr lang="en-US" sz="2000" dirty="0"/>
-              <a:t>Michael Hewner (based on course designed by Claude Anderson)</a:t>
-            </a:r>
-            <a:br>
-              <a:rPr lang="en-US" sz="2000" dirty="0"/>
-            </a:br>
-            <a:r>
-              <a:rPr lang="en-US" sz="2000" dirty="0"/>
-              <a:t>Professor of Computer Science and Software Engineering</a:t>
-            </a:r>
-            <a:br>
-              <a:rPr lang="en-US" sz="2000" dirty="0"/>
-            </a:br>
-            <a:endParaRPr lang="en-US" sz="2000" dirty="0"/>
-          </a:p>
-          <a:p>
-            <a:pPr>
-              <a:lnSpc>
-                <a:spcPct val="90000"/>
-              </a:lnSpc>
-            </a:pPr>
-            <a:r>
-              <a:rPr lang="en-US" sz="2400" dirty="0"/>
-              <a:t>Office hours </a:t>
-            </a:r>
-          </a:p>
-          <a:p>
-            <a:pPr>
-              <a:lnSpc>
-                <a:spcPct val="90000"/>
-              </a:lnSpc>
-            </a:pPr>
-            <a:r>
-              <a:rPr lang="en-US" sz="2400" dirty="0"/>
-              <a:t>2PM M,T</a:t>
-            </a:r>
-          </a:p>
-          <a:p>
-            <a:pPr>
-              <a:lnSpc>
-                <a:spcPct val="90000"/>
-              </a:lnSpc>
-            </a:pPr>
-            <a:r>
-              <a:rPr lang="en-US" sz="2400" dirty="0"/>
-              <a:t>3PM </a:t>
-            </a:r>
-            <a:r>
-              <a:rPr lang="en-US" sz="2400" dirty="0" err="1"/>
-              <a:t>Th,Fi</a:t>
-            </a:r>
-            <a:endParaRPr lang="en-US" sz="2400" dirty="0"/>
-          </a:p>
-          <a:p>
-            <a:pPr>
-              <a:lnSpc>
-                <a:spcPct val="90000"/>
-              </a:lnSpc>
-            </a:pPr>
-            <a:r>
-              <a:rPr lang="en-US" sz="2400" dirty="0">
-                <a:hlinkClick r:id="rId3"/>
-              </a:rPr>
-              <a:t>hewner@rose-hulman.edu</a:t>
-            </a:r>
-            <a:endParaRPr lang="en-US" sz="2400" dirty="0"/>
-          </a:p>
-          <a:p>
-            <a:pPr>
-              <a:lnSpc>
-                <a:spcPct val="90000"/>
-              </a:lnSpc>
-            </a:pPr>
-            <a:r>
-              <a:rPr lang="en-US" sz="2400" dirty="0"/>
-              <a:t>Post your questions on class message board!</a:t>
-            </a:r>
-          </a:p>
-        </p:txBody>
-      </p:sp>
+            <a:r>
+              <a:rPr lang="en-US" dirty="0"/>
+              <a:t>Talk with the other student(s) at your table.</a:t>
+            </a:r>
+          </a:p>
+          <a:p>
+            <a:r>
+              <a:rPr lang="en-US" dirty="0"/>
+              <a:t>What will Scheme print when we enter each of these?</a:t>
+            </a:r>
+          </a:p>
+        </p:txBody>
+      </p:sp>
+      <p:pic>
+        <p:nvPicPr>
+          <p:cNvPr id="5" name="Picture 4">
+            <a:extLst>
+              <a:ext uri="{FF2B5EF4-FFF2-40B4-BE49-F238E27FC236}">
+                <a16:creationId xmlns:a16="http://schemas.microsoft.com/office/drawing/2014/main" id="{7A81C755-04CB-4C04-B707-03527B8B45AD}"/>
+              </a:ext>
+            </a:extLst>
+          </p:cNvPr>
+          <p:cNvPicPr>
+            <a:picLocks noChangeAspect="1"/>
+          </p:cNvPicPr>
+          <p:nvPr/>
+        </p:nvPicPr>
+        <p:blipFill>
+          <a:blip r:embed="rId2"/>
+          <a:stretch>
+            <a:fillRect/>
+          </a:stretch>
+        </p:blipFill>
+        <p:spPr>
+          <a:xfrm>
+            <a:off x="3657600" y="2224088"/>
+            <a:ext cx="7848600" cy="4129492"/>
+          </a:xfrm>
+          <a:prstGeom prst="rect">
+            <a:avLst/>
+          </a:prstGeom>
+        </p:spPr>
+      </p:pic>
     </p:spTree>
+    <p:extLst>
+      <p:ext uri="{BB962C8B-B14F-4D97-AF65-F5344CB8AC3E}">
+        <p14:creationId xmlns:p14="http://schemas.microsoft.com/office/powerpoint/2010/main" val="1726035955"/>
+      </p:ext>
+    </p:extLst>
   </p:cSld>
   <p:clrMapOvr>
     <a:masterClrMapping/>
@@ -5445,6 +5469,369 @@
 </file>
 
 <file path=ppt/slides/slide10.xml><?xml version="1.0" encoding="utf-8"?>
+<p:sld xmlns:a="http://schemas.openxmlformats.org/drawingml/2006/main" xmlns:r="http://schemas.openxmlformats.org/officeDocument/2006/relationships" xmlns:p="http://schemas.openxmlformats.org/presentationml/2006/main" showMasterPhAnim="0">
+  <p:cSld>
+    <p:spTree>
+      <p:nvGrpSpPr>
+        <p:cNvPr id="1" name=""/>
+        <p:cNvGrpSpPr/>
+        <p:nvPr/>
+      </p:nvGrpSpPr>
+      <p:grpSpPr>
+        <a:xfrm>
+          <a:off x="0" y="0"/>
+          <a:ext cx="0" cy="0"/>
+          <a:chOff x="0" y="0"/>
+          <a:chExt cx="0" cy="0"/>
+        </a:xfrm>
+      </p:grpSpPr>
+      <p:sp>
+        <p:nvSpPr>
+          <p:cNvPr id="37890" name="Rectangle 2"/>
+          <p:cNvSpPr>
+            <a:spLocks noGrp="1" noChangeArrowheads="1"/>
+          </p:cNvSpPr>
+          <p:nvPr>
+            <p:ph type="title"/>
+          </p:nvPr>
+        </p:nvSpPr>
+        <p:spPr>
+          <a:xfrm>
+            <a:off x="2286000" y="0"/>
+            <a:ext cx="7772400" cy="1066800"/>
+          </a:xfrm>
+        </p:spPr>
+        <p:txBody>
+          <a:bodyPr/>
+          <a:lstStyle/>
+          <a:p>
+            <a:r>
+              <a:rPr lang="en-US" dirty="0"/>
+              <a:t>Overview of Scheme 1</a:t>
+            </a:r>
+          </a:p>
+        </p:txBody>
+      </p:sp>
+      <p:sp>
+        <p:nvSpPr>
+          <p:cNvPr id="37891" name="Rectangle 3"/>
+          <p:cNvSpPr>
+            <a:spLocks noGrp="1" noChangeArrowheads="1"/>
+          </p:cNvSpPr>
+          <p:nvPr>
+            <p:ph type="body" idx="1"/>
+          </p:nvPr>
+        </p:nvSpPr>
+        <p:spPr>
+          <a:xfrm>
+            <a:off x="2057400" y="990600"/>
+            <a:ext cx="8382000" cy="5867400"/>
+          </a:xfrm>
+        </p:spPr>
+        <p:txBody>
+          <a:bodyPr/>
+          <a:lstStyle/>
+          <a:p>
+            <a:r>
+              <a:rPr lang="en-US" dirty="0"/>
+              <a:t>Invented in 1975 by Guy Steele and Gerald </a:t>
+            </a:r>
+            <a:r>
+              <a:rPr lang="en-US" dirty="0" err="1"/>
+              <a:t>Sussman</a:t>
+            </a:r>
+            <a:r>
+              <a:rPr lang="en-US" dirty="0"/>
+              <a:t> at MIT.</a:t>
+            </a:r>
+          </a:p>
+          <a:p>
+            <a:r>
+              <a:rPr lang="en-US" dirty="0"/>
+              <a:t>Syntax similar to LISP, semantics more like the </a:t>
+            </a:r>
+            <a:r>
+              <a:rPr lang="en-US" dirty="0" err="1"/>
+              <a:t>Algol</a:t>
+            </a:r>
+            <a:r>
+              <a:rPr lang="en-US" dirty="0"/>
+              <a:t> family (Pascal, </a:t>
+            </a:r>
+            <a:r>
+              <a:rPr lang="en-US" dirty="0" err="1"/>
+              <a:t>Ada</a:t>
+            </a:r>
+            <a:r>
+              <a:rPr lang="en-US" dirty="0"/>
+              <a:t>, C, Java …)</a:t>
+            </a:r>
+          </a:p>
+          <a:p>
+            <a:r>
+              <a:rPr lang="en-US" dirty="0"/>
+              <a:t>Expression-oriented and interactive (like Maple, Python, </a:t>
+            </a:r>
+            <a:r>
+              <a:rPr lang="en-US" dirty="0" err="1"/>
+              <a:t>MatLab</a:t>
+            </a:r>
+            <a:r>
+              <a:rPr lang="en-US" dirty="0"/>
+              <a:t>).</a:t>
+            </a:r>
+          </a:p>
+        </p:txBody>
+      </p:sp>
+    </p:spTree>
+  </p:cSld>
+  <p:clrMapOvr>
+    <a:masterClrMapping/>
+  </p:clrMapOvr>
+  <p:timing>
+    <p:tnLst>
+      <p:par>
+        <p:cTn id="1" dur="indefinite" restart="never" nodeType="tmRoot">
+          <p:childTnLst>
+            <p:seq concurrent="1" nextAc="seek">
+              <p:cTn id="2" dur="indefinite" nodeType="mainSeq">
+                <p:childTnLst>
+                  <p:par>
+                    <p:cTn id="3" fill="hold">
+                      <p:stCondLst>
+                        <p:cond delay="indefinite"/>
+                      </p:stCondLst>
+                      <p:childTnLst>
+                        <p:par>
+                          <p:cTn id="4" fill="hold">
+                            <p:stCondLst>
+                              <p:cond delay="0"/>
+                            </p:stCondLst>
+                            <p:childTnLst>
+                              <p:par>
+                                <p:cTn id="5" presetID="1" presetClass="entr" presetSubtype="0" fill="hold" grpId="0" nodeType="clickEffect">
+                                  <p:stCondLst>
+                                    <p:cond delay="0"/>
+                                  </p:stCondLst>
+                                  <p:childTnLst>
+                                    <p:set>
+                                      <p:cBhvr>
+                                        <p:cTn id="6" dur="1" fill="hold">
+                                          <p:stCondLst>
+                                            <p:cond delay="0"/>
+                                          </p:stCondLst>
+                                        </p:cTn>
+                                        <p:tgtEl>
+                                          <p:spTgt spid="37891">
+                                            <p:txEl>
+                                              <p:pRg st="0" end="0"/>
+                                            </p:txEl>
+                                          </p:spTgt>
+                                        </p:tgtEl>
+                                        <p:attrNameLst>
+                                          <p:attrName>style.visibility</p:attrName>
+                                        </p:attrNameLst>
+                                      </p:cBhvr>
+                                      <p:to>
+                                        <p:strVal val="visible"/>
+                                      </p:to>
+                                    </p:set>
+                                  </p:childTnLst>
+                                  <p:subTnLst>
+                                    <p:animClr clrSpc="rgb" dir="cw">
+                                      <p:cBhvr override="childStyle">
+                                        <p:cTn dur="1" fill="hold" display="0" masterRel="nextClick" afterEffect="1"/>
+                                        <p:tgtEl>
+                                          <p:spTgt spid="37891">
+                                            <p:txEl>
+                                              <p:pRg st="0" end="0"/>
+                                            </p:txEl>
+                                          </p:spTgt>
+                                        </p:tgtEl>
+                                        <p:attrNameLst>
+                                          <p:attrName>ppt_c</p:attrName>
+                                        </p:attrNameLst>
+                                      </p:cBhvr>
+                                      <p:to>
+                                        <a:schemeClr val="bg2"/>
+                                      </p:to>
+                                    </p:animClr>
+                                  </p:subTnLst>
+                                </p:cTn>
+                              </p:par>
+                            </p:childTnLst>
+                          </p:cTn>
+                        </p:par>
+                      </p:childTnLst>
+                    </p:cTn>
+                  </p:par>
+                  <p:par>
+                    <p:cTn id="7" fill="hold">
+                      <p:stCondLst>
+                        <p:cond delay="indefinite"/>
+                      </p:stCondLst>
+                      <p:childTnLst>
+                        <p:par>
+                          <p:cTn id="8" fill="hold">
+                            <p:stCondLst>
+                              <p:cond delay="0"/>
+                            </p:stCondLst>
+                            <p:childTnLst>
+                              <p:par>
+                                <p:cTn id="9" presetID="1" presetClass="entr" presetSubtype="0" fill="hold" grpId="0" nodeType="clickEffect">
+                                  <p:stCondLst>
+                                    <p:cond delay="0"/>
+                                  </p:stCondLst>
+                                  <p:childTnLst>
+                                    <p:set>
+                                      <p:cBhvr>
+                                        <p:cTn id="10" dur="1" fill="hold">
+                                          <p:stCondLst>
+                                            <p:cond delay="0"/>
+                                          </p:stCondLst>
+                                        </p:cTn>
+                                        <p:tgtEl>
+                                          <p:spTgt spid="37891">
+                                            <p:txEl>
+                                              <p:pRg st="1" end="1"/>
+                                            </p:txEl>
+                                          </p:spTgt>
+                                        </p:tgtEl>
+                                        <p:attrNameLst>
+                                          <p:attrName>style.visibility</p:attrName>
+                                        </p:attrNameLst>
+                                      </p:cBhvr>
+                                      <p:to>
+                                        <p:strVal val="visible"/>
+                                      </p:to>
+                                    </p:set>
+                                  </p:childTnLst>
+                                  <p:subTnLst>
+                                    <p:animClr clrSpc="rgb" dir="cw">
+                                      <p:cBhvr override="childStyle">
+                                        <p:cTn dur="1" fill="hold" display="0" masterRel="nextClick" afterEffect="1"/>
+                                        <p:tgtEl>
+                                          <p:spTgt spid="37891">
+                                            <p:txEl>
+                                              <p:pRg st="1" end="1"/>
+                                            </p:txEl>
+                                          </p:spTgt>
+                                        </p:tgtEl>
+                                        <p:attrNameLst>
+                                          <p:attrName>ppt_c</p:attrName>
+                                        </p:attrNameLst>
+                                      </p:cBhvr>
+                                      <p:to>
+                                        <a:schemeClr val="bg2"/>
+                                      </p:to>
+                                    </p:animClr>
+                                  </p:subTnLst>
+                                </p:cTn>
+                              </p:par>
+                            </p:childTnLst>
+                          </p:cTn>
+                        </p:par>
+                      </p:childTnLst>
+                    </p:cTn>
+                  </p:par>
+                  <p:par>
+                    <p:cTn id="11" fill="hold">
+                      <p:stCondLst>
+                        <p:cond delay="indefinite"/>
+                      </p:stCondLst>
+                      <p:childTnLst>
+                        <p:par>
+                          <p:cTn id="12" fill="hold">
+                            <p:stCondLst>
+                              <p:cond delay="0"/>
+                            </p:stCondLst>
+                            <p:childTnLst>
+                              <p:par>
+                                <p:cTn id="13" presetID="1" presetClass="entr" presetSubtype="0" fill="hold" grpId="0" nodeType="clickEffect">
+                                  <p:stCondLst>
+                                    <p:cond delay="0"/>
+                                  </p:stCondLst>
+                                  <p:childTnLst>
+                                    <p:set>
+                                      <p:cBhvr>
+                                        <p:cTn id="14" dur="1" fill="hold">
+                                          <p:stCondLst>
+                                            <p:cond delay="0"/>
+                                          </p:stCondLst>
+                                        </p:cTn>
+                                        <p:tgtEl>
+                                          <p:spTgt spid="37891">
+                                            <p:txEl>
+                                              <p:pRg st="2" end="2"/>
+                                            </p:txEl>
+                                          </p:spTgt>
+                                        </p:tgtEl>
+                                        <p:attrNameLst>
+                                          <p:attrName>style.visibility</p:attrName>
+                                        </p:attrNameLst>
+                                      </p:cBhvr>
+                                      <p:to>
+                                        <p:strVal val="visible"/>
+                                      </p:to>
+                                    </p:set>
+                                  </p:childTnLst>
+                                  <p:subTnLst>
+                                    <p:animClr clrSpc="rgb" dir="cw">
+                                      <p:cBhvr override="childStyle">
+                                        <p:cTn dur="1" fill="hold" display="0" masterRel="nextClick" afterEffect="1"/>
+                                        <p:tgtEl>
+                                          <p:spTgt spid="37891">
+                                            <p:txEl>
+                                              <p:pRg st="2" end="2"/>
+                                            </p:txEl>
+                                          </p:spTgt>
+                                        </p:tgtEl>
+                                        <p:attrNameLst>
+                                          <p:attrName>ppt_c</p:attrName>
+                                        </p:attrNameLst>
+                                      </p:cBhvr>
+                                      <p:to>
+                                        <a:schemeClr val="bg2"/>
+                                      </p:to>
+                                    </p:animClr>
+                                  </p:subTnLst>
+                                </p:cTn>
+                              </p:par>
+                            </p:childTnLst>
+                          </p:cTn>
+                        </p:par>
+                      </p:childTnLst>
+                    </p:cTn>
+                  </p:par>
+                </p:childTnLst>
+              </p:cTn>
+              <p:prevCondLst>
+                <p:cond evt="onPrev" delay="0">
+                  <p:tgtEl>
+                    <p:sldTgt/>
+                  </p:tgtEl>
+                </p:cond>
+              </p:prevCondLst>
+              <p:nextCondLst>
+                <p:cond evt="onNext" delay="0">
+                  <p:tgtEl>
+                    <p:sldTgt/>
+                  </p:tgtEl>
+                </p:cond>
+              </p:nextCondLst>
+            </p:seq>
+          </p:childTnLst>
+        </p:cTn>
+      </p:par>
+    </p:tnLst>
+    <p:bldLst>
+      <p:bldP spid="37891" grpId="0" build="p"/>
+    </p:bldLst>
+  </p:timing>
+</p:sld>
+</file>
+
+<file path=ppt/slides/slide11.xml><?xml version="1.0" encoding="utf-8"?>
 <p:sld xmlns:a="http://schemas.openxmlformats.org/drawingml/2006/main" xmlns:r="http://schemas.openxmlformats.org/officeDocument/2006/relationships" xmlns:p="http://schemas.openxmlformats.org/presentationml/2006/main" showMasterPhAnim="0">
   <p:cSld>
     <p:spTree>
@@ -6222,7 +6609,7 @@
 </p:sld>
 </file>
 
-<file path=ppt/slides/slide11.xml><?xml version="1.0" encoding="utf-8"?>
+<file path=ppt/slides/slide12.xml><?xml version="1.0" encoding="utf-8"?>
 <p:sld xmlns:a="http://schemas.openxmlformats.org/drawingml/2006/main" xmlns:r="http://schemas.openxmlformats.org/officeDocument/2006/relationships" xmlns:p="http://schemas.openxmlformats.org/presentationml/2006/main" showMasterPhAnim="0">
   <p:cSld>
     <p:spTree>
@@ -6860,7 +7247,7 @@
 </p:sld>
 </file>
 
-<file path=ppt/slides/slide12.xml><?xml version="1.0" encoding="utf-8"?>
+<file path=ppt/slides/slide13.xml><?xml version="1.0" encoding="utf-8"?>
 <p:sld xmlns:a="http://schemas.openxmlformats.org/drawingml/2006/main" xmlns:r="http://schemas.openxmlformats.org/officeDocument/2006/relationships" xmlns:p="http://schemas.openxmlformats.org/presentationml/2006/main" showMasterPhAnim="0">
   <p:cSld>
     <p:spTree>
@@ -7349,7 +7736,7 @@
 </p:sld>
 </file>
 
-<file path=ppt/slides/slide13.xml><?xml version="1.0" encoding="utf-8"?>
+<file path=ppt/slides/slide14.xml><?xml version="1.0" encoding="utf-8"?>
 <p:sld xmlns:a="http://schemas.openxmlformats.org/drawingml/2006/main" xmlns:r="http://schemas.openxmlformats.org/officeDocument/2006/relationships" xmlns:p="http://schemas.openxmlformats.org/presentationml/2006/main" showMasterPhAnim="0">
   <p:cSld>
     <p:spTree>
@@ -8204,7 +8591,7 @@
 </p:sld>
 </file>
 
-<file path=ppt/slides/slide14.xml><?xml version="1.0" encoding="utf-8"?>
+<file path=ppt/slides/slide15.xml><?xml version="1.0" encoding="utf-8"?>
 <p:sld xmlns:a="http://schemas.openxmlformats.org/drawingml/2006/main" xmlns:r="http://schemas.openxmlformats.org/officeDocument/2006/relationships" xmlns:p="http://schemas.openxmlformats.org/presentationml/2006/main" showMasterPhAnim="0">
   <p:cSld>
     <p:spTree>
@@ -9306,7 +9693,7 @@
 </p:sld>
 </file>
 
-<file path=ppt/slides/slide15.xml><?xml version="1.0" encoding="utf-8"?>
+<file path=ppt/slides/slide16.xml><?xml version="1.0" encoding="utf-8"?>
 <p:sld xmlns:a="http://schemas.openxmlformats.org/drawingml/2006/main" xmlns:r="http://schemas.openxmlformats.org/officeDocument/2006/relationships" xmlns:p="http://schemas.openxmlformats.org/presentationml/2006/main">
   <p:cSld>
     <p:spTree>
@@ -9556,109 +9943,108 @@
       </p:grpSpPr>
       <p:sp>
         <p:nvSpPr>
-          <p:cNvPr id="32770" name="Rectangle 2"/>
+          <p:cNvPr id="2050" name="Rectangle 2"/>
           <p:cNvSpPr>
             <a:spLocks noGrp="1" noChangeArrowheads="1"/>
           </p:cNvSpPr>
           <p:nvPr>
-            <p:ph type="title"/>
+            <p:ph type="ctrTitle"/>
           </p:nvPr>
         </p:nvSpPr>
         <p:spPr>
           <a:xfrm>
-            <a:off x="2209800" y="152400"/>
-            <a:ext cx="7772400" cy="1066800"/>
+            <a:off x="1828800" y="1066800"/>
+            <a:ext cx="8763000" cy="990600"/>
           </a:xfrm>
         </p:spPr>
         <p:txBody>
           <a:bodyPr/>
           <a:lstStyle/>
           <a:p>
-            <a:r>
-              <a:rPr lang="en-US" dirty="0"/>
-              <a:t>CSSE 304 Day 1</a:t>
-            </a:r>
-          </a:p>
-        </p:txBody>
-      </p:sp>
-      <p:sp>
-        <p:nvSpPr>
-          <p:cNvPr id="32771" name="Rectangle 3"/>
+            <a:pPr>
+              <a:lnSpc>
+                <a:spcPct val="90000"/>
+              </a:lnSpc>
+            </a:pPr>
+            <a:r>
+              <a:rPr lang="en-US" sz="4400" dirty="0"/>
+              <a:t>CSSE 304</a:t>
+            </a:r>
+            <a:br>
+              <a:rPr lang="en-US" sz="4400" dirty="0"/>
+            </a:br>
+            <a:r>
+              <a:rPr lang="en-US" sz="4400" dirty="0"/>
+              <a:t>Programming Language Concepts</a:t>
+            </a:r>
+          </a:p>
+        </p:txBody>
+      </p:sp>
+      <p:sp>
+        <p:nvSpPr>
+          <p:cNvPr id="2051" name="Rectangle 3"/>
           <p:cNvSpPr>
             <a:spLocks noGrp="1" noChangeArrowheads="1"/>
           </p:cNvSpPr>
           <p:nvPr>
-            <p:ph type="body" idx="1"/>
+            <p:ph type="subTitle" idx="1"/>
           </p:nvPr>
         </p:nvSpPr>
         <p:spPr>
           <a:xfrm>
-            <a:off x="990600" y="1295400"/>
-            <a:ext cx="10972800" cy="4191000"/>
+            <a:off x="228600" y="2895600"/>
+            <a:ext cx="11734800" cy="3352800"/>
           </a:xfrm>
         </p:spPr>
         <p:txBody>
           <a:bodyPr/>
           <a:lstStyle/>
           <a:p>
-            <a:r>
-              <a:rPr lang="en-US" dirty="0"/>
-              <a:t>What's on the web?</a:t>
-            </a:r>
-          </a:p>
-          <a:p>
-            <a:r>
-              <a:rPr lang="en-US" dirty="0"/>
-              <a:t>Scheme Intro (assumes that you viewed the five videos)</a:t>
-            </a:r>
-          </a:p>
-          <a:p>
-            <a:r>
-              <a:rPr lang="en-US" dirty="0"/>
-              <a:t>Instructor/course intro: </a:t>
-            </a:r>
-            <a:r>
-              <a:rPr lang="en-US" b="1" dirty="0">
-                <a:solidFill>
-                  <a:srgbClr val="FFFF6D"/>
-                </a:solidFill>
+            <a:pPr>
+              <a:lnSpc>
+                <a:spcPct val="90000"/>
+              </a:lnSpc>
+            </a:pPr>
+            <a:r>
+              <a:rPr lang="en-US" sz="2000" dirty="0"/>
+              <a:t>Michael Hewner (based on course designed by Claude Anderson)</a:t>
+            </a:r>
+            <a:br>
+              <a:rPr lang="en-US" sz="2000" dirty="0"/>
+            </a:br>
+            <a:r>
+              <a:rPr lang="en-US" sz="2000" dirty="0"/>
+              <a:t>Professor of Computer Science and Software Engineering</a:t>
+            </a:r>
+            <a:br>
+              <a:rPr lang="en-US" sz="2000" dirty="0"/>
+            </a:br>
+            <a:endParaRPr lang="en-US" sz="2000" dirty="0"/>
+          </a:p>
+          <a:p>
+            <a:pPr>
+              <a:lnSpc>
+                <a:spcPct val="90000"/>
+              </a:lnSpc>
+            </a:pPr>
+            <a:r>
+              <a:rPr lang="en-US" sz="2400" dirty="0">
+                <a:hlinkClick r:id="rId3"/>
               </a:rPr>
-              <a:t>will happen Day 3</a:t>
-            </a:r>
-          </a:p>
-          <a:p>
-            <a:pPr lvl="1"/>
-            <a:r>
-              <a:rPr lang="en-US" dirty="0"/>
-              <a:t>because we will dive into Scheme for the first  two class days.</a:t>
-            </a:r>
-          </a:p>
-          <a:p>
-            <a:r>
-              <a:rPr lang="en-US" dirty="0"/>
-              <a:t>                   </a:t>
-            </a:r>
-            <a:r>
-              <a:rPr lang="en-US" b="1" dirty="0">
-                <a:solidFill>
-                  <a:srgbClr val="D8D96B"/>
-                </a:solidFill>
-              </a:rPr>
-              <a:t>Scheme-a-thon</a:t>
-            </a:r>
-            <a:r>
-              <a:rPr lang="en-US" dirty="0"/>
-              <a:t>:  Days 1-12.</a:t>
-            </a:r>
-          </a:p>
-          <a:p>
-            <a:pPr lvl="1">
-              <a:buNone/>
+              <a:t>hewner@rose-hulman.edu</a:t>
+            </a:r>
+            <a:endParaRPr lang="en-US" sz="2400" dirty="0"/>
+          </a:p>
+          <a:p>
+            <a:pPr>
+              <a:lnSpc>
+                <a:spcPct val="90000"/>
+              </a:lnSpc>
             </a:pPr>
-            <a:endParaRPr lang="en-US" dirty="0"/>
-          </a:p>
-          <a:p>
-            <a:endParaRPr lang="en-US" dirty="0"/>
+            <a:r>
+              <a:rPr lang="en-US" sz="2400" dirty="0"/>
+              <a:t>Post your questions on class message board!</a:t>
+            </a:r>
           </a:p>
         </p:txBody>
       </p:sp>
@@ -9689,6 +10075,139 @@
       </p:grpSpPr>
       <p:sp>
         <p:nvSpPr>
+          <p:cNvPr id="32770" name="Rectangle 2"/>
+          <p:cNvSpPr>
+            <a:spLocks noGrp="1" noChangeArrowheads="1"/>
+          </p:cNvSpPr>
+          <p:nvPr>
+            <p:ph type="title"/>
+          </p:nvPr>
+        </p:nvSpPr>
+        <p:spPr>
+          <a:xfrm>
+            <a:off x="2209800" y="152400"/>
+            <a:ext cx="7772400" cy="1066800"/>
+          </a:xfrm>
+        </p:spPr>
+        <p:txBody>
+          <a:bodyPr/>
+          <a:lstStyle/>
+          <a:p>
+            <a:r>
+              <a:rPr lang="en-US" dirty="0"/>
+              <a:t>CSSE 304 Day 1</a:t>
+            </a:r>
+          </a:p>
+        </p:txBody>
+      </p:sp>
+      <p:sp>
+        <p:nvSpPr>
+          <p:cNvPr id="32771" name="Rectangle 3"/>
+          <p:cNvSpPr>
+            <a:spLocks noGrp="1" noChangeArrowheads="1"/>
+          </p:cNvSpPr>
+          <p:nvPr>
+            <p:ph type="body" idx="1"/>
+          </p:nvPr>
+        </p:nvSpPr>
+        <p:spPr>
+          <a:xfrm>
+            <a:off x="990600" y="1295400"/>
+            <a:ext cx="10972800" cy="4191000"/>
+          </a:xfrm>
+        </p:spPr>
+        <p:txBody>
+          <a:bodyPr/>
+          <a:lstStyle/>
+          <a:p>
+            <a:r>
+              <a:rPr lang="en-US" dirty="0"/>
+              <a:t>What's on the web?</a:t>
+            </a:r>
+          </a:p>
+          <a:p>
+            <a:r>
+              <a:rPr lang="en-US" dirty="0"/>
+              <a:t>Scheme Intro (assumes that you viewed the five videos)</a:t>
+            </a:r>
+          </a:p>
+          <a:p>
+            <a:r>
+              <a:rPr lang="en-US" dirty="0"/>
+              <a:t>Instructor/course intro: </a:t>
+            </a:r>
+            <a:r>
+              <a:rPr lang="en-US" b="1" dirty="0">
+                <a:solidFill>
+                  <a:srgbClr val="FFFF6D"/>
+                </a:solidFill>
+              </a:rPr>
+              <a:t>will happen Day 3</a:t>
+            </a:r>
+          </a:p>
+          <a:p>
+            <a:pPr lvl="1"/>
+            <a:r>
+              <a:rPr lang="en-US" dirty="0"/>
+              <a:t>because we will dive into Scheme for the first  two class days.</a:t>
+            </a:r>
+          </a:p>
+          <a:p>
+            <a:r>
+              <a:rPr lang="en-US" dirty="0"/>
+              <a:t>                   </a:t>
+            </a:r>
+            <a:r>
+              <a:rPr lang="en-US" b="1" dirty="0">
+                <a:solidFill>
+                  <a:srgbClr val="D8D96B"/>
+                </a:solidFill>
+              </a:rPr>
+              <a:t>Scheme-a-thon</a:t>
+            </a:r>
+            <a:r>
+              <a:rPr lang="en-US" dirty="0"/>
+              <a:t>:  Days 1-12.</a:t>
+            </a:r>
+          </a:p>
+          <a:p>
+            <a:pPr lvl="1">
+              <a:buNone/>
+            </a:pPr>
+            <a:endParaRPr lang="en-US" dirty="0"/>
+          </a:p>
+          <a:p>
+            <a:endParaRPr lang="en-US" dirty="0"/>
+          </a:p>
+        </p:txBody>
+      </p:sp>
+    </p:spTree>
+  </p:cSld>
+  <p:clrMapOvr>
+    <a:masterClrMapping/>
+  </p:clrMapOvr>
+</p:sld>
+</file>
+
+<file path=ppt/slides/slide4.xml><?xml version="1.0" encoding="utf-8"?>
+<p:sld xmlns:a="http://schemas.openxmlformats.org/drawingml/2006/main" xmlns:r="http://schemas.openxmlformats.org/officeDocument/2006/relationships" xmlns:p="http://schemas.openxmlformats.org/presentationml/2006/main">
+  <p:cSld>
+    <p:spTree>
+      <p:nvGrpSpPr>
+        <p:cNvPr id="1" name=""/>
+        <p:cNvGrpSpPr/>
+        <p:nvPr/>
+      </p:nvGrpSpPr>
+      <p:grpSpPr>
+        <a:xfrm>
+          <a:off x="0" y="0"/>
+          <a:ext cx="0" cy="0"/>
+          <a:chOff x="0" y="0"/>
+          <a:chExt cx="0" cy="0"/>
+        </a:xfrm>
+      </p:grpSpPr>
+      <p:sp>
+        <p:nvSpPr>
           <p:cNvPr id="2" name="Title 1">
             <a:extLst>
               <a:ext uri="{FF2B5EF4-FFF2-40B4-BE49-F238E27FC236}">
@@ -9762,7 +10281,7 @@
 </p:sld>
 </file>
 
-<file path=ppt/slides/slide4.xml><?xml version="1.0" encoding="utf-8"?>
+<file path=ppt/slides/slide5.xml><?xml version="1.0" encoding="utf-8"?>
 <p:sld xmlns:a="http://schemas.openxmlformats.org/drawingml/2006/main" xmlns:r="http://schemas.openxmlformats.org/officeDocument/2006/relationships" xmlns:p="http://schemas.openxmlformats.org/presentationml/2006/main">
   <p:cSld>
     <p:spTree>
@@ -9926,7 +10445,7 @@
 </p:sld>
 </file>
 
-<file path=ppt/slides/slide5.xml><?xml version="1.0" encoding="utf-8"?>
+<file path=ppt/slides/slide6.xml><?xml version="1.0" encoding="utf-8"?>
 <p:sld xmlns:a="http://schemas.openxmlformats.org/drawingml/2006/main" xmlns:r="http://schemas.openxmlformats.org/officeDocument/2006/relationships" xmlns:p="http://schemas.openxmlformats.org/presentationml/2006/main">
   <p:cSld>
     <p:spTree>
@@ -10040,7 +10559,7 @@
             </a:pPr>
             <a:r>
               <a:rPr lang="en-US" dirty="0"/>
-              <a:t>Scheme is a fertile substrate: less a language than a toolkit to make building your own language.</a:t>
+              <a:t>Scheme is a fertile substrate: less a language than a toolkit to build your own language.</a:t>
             </a:r>
           </a:p>
         </p:txBody>
@@ -10058,7 +10577,7 @@
 </p:sld>
 </file>
 
-<file path=ppt/slides/slide6.xml><?xml version="1.0" encoding="utf-8"?>
+<file path=ppt/slides/slide7.xml><?xml version="1.0" encoding="utf-8"?>
 <p:sld xmlns:a="http://schemas.openxmlformats.org/drawingml/2006/main" xmlns:r="http://schemas.openxmlformats.org/officeDocument/2006/relationships" xmlns:p="http://schemas.openxmlformats.org/presentationml/2006/main">
   <p:cSld>
     <p:spTree>
@@ -10225,7 +10744,7 @@
 </p:sld>
 </file>
 
-<file path=ppt/slides/slide7.xml><?xml version="1.0" encoding="utf-8"?>
+<file path=ppt/slides/slide8.xml><?xml version="1.0" encoding="utf-8"?>
 <p:sld xmlns:a="http://schemas.openxmlformats.org/drawingml/2006/main" xmlns:r="http://schemas.openxmlformats.org/officeDocument/2006/relationships" xmlns:p="http://schemas.openxmlformats.org/presentationml/2006/main">
   <p:cSld>
     <p:spTree>
@@ -10357,7 +10876,7 @@
 </p:sld>
 </file>
 
-<file path=ppt/slides/slide8.xml><?xml version="1.0" encoding="utf-8"?>
+<file path=ppt/slides/slide9.xml><?xml version="1.0" encoding="utf-8"?>
 <p:sld xmlns:a="http://schemas.openxmlformats.org/drawingml/2006/main" xmlns:r="http://schemas.openxmlformats.org/officeDocument/2006/relationships" xmlns:p="http://schemas.openxmlformats.org/presentationml/2006/main">
   <p:cSld>
     <p:spTree>
@@ -10468,369 +10987,6 @@
   <p:clrMapOvr>
     <a:masterClrMapping/>
   </p:clrMapOvr>
-</p:sld>
-</file>
-
-<file path=ppt/slides/slide9.xml><?xml version="1.0" encoding="utf-8"?>
-<p:sld xmlns:a="http://schemas.openxmlformats.org/drawingml/2006/main" xmlns:r="http://schemas.openxmlformats.org/officeDocument/2006/relationships" xmlns:p="http://schemas.openxmlformats.org/presentationml/2006/main" showMasterPhAnim="0">
-  <p:cSld>
-    <p:spTree>
-      <p:nvGrpSpPr>
-        <p:cNvPr id="1" name=""/>
-        <p:cNvGrpSpPr/>
-        <p:nvPr/>
-      </p:nvGrpSpPr>
-      <p:grpSpPr>
-        <a:xfrm>
-          <a:off x="0" y="0"/>
-          <a:ext cx="0" cy="0"/>
-          <a:chOff x="0" y="0"/>
-          <a:chExt cx="0" cy="0"/>
-        </a:xfrm>
-      </p:grpSpPr>
-      <p:sp>
-        <p:nvSpPr>
-          <p:cNvPr id="37890" name="Rectangle 2"/>
-          <p:cNvSpPr>
-            <a:spLocks noGrp="1" noChangeArrowheads="1"/>
-          </p:cNvSpPr>
-          <p:nvPr>
-            <p:ph type="title"/>
-          </p:nvPr>
-        </p:nvSpPr>
-        <p:spPr>
-          <a:xfrm>
-            <a:off x="2286000" y="0"/>
-            <a:ext cx="7772400" cy="1066800"/>
-          </a:xfrm>
-        </p:spPr>
-        <p:txBody>
-          <a:bodyPr/>
-          <a:lstStyle/>
-          <a:p>
-            <a:r>
-              <a:rPr lang="en-US" dirty="0"/>
-              <a:t>Overview of Scheme 1</a:t>
-            </a:r>
-          </a:p>
-        </p:txBody>
-      </p:sp>
-      <p:sp>
-        <p:nvSpPr>
-          <p:cNvPr id="37891" name="Rectangle 3"/>
-          <p:cNvSpPr>
-            <a:spLocks noGrp="1" noChangeArrowheads="1"/>
-          </p:cNvSpPr>
-          <p:nvPr>
-            <p:ph type="body" idx="1"/>
-          </p:nvPr>
-        </p:nvSpPr>
-        <p:spPr>
-          <a:xfrm>
-            <a:off x="2057400" y="990600"/>
-            <a:ext cx="8382000" cy="5867400"/>
-          </a:xfrm>
-        </p:spPr>
-        <p:txBody>
-          <a:bodyPr/>
-          <a:lstStyle/>
-          <a:p>
-            <a:r>
-              <a:rPr lang="en-US" dirty="0"/>
-              <a:t>Invented in 1975 by Guy Steele and Gerald </a:t>
-            </a:r>
-            <a:r>
-              <a:rPr lang="en-US" dirty="0" err="1"/>
-              <a:t>Sussman</a:t>
-            </a:r>
-            <a:r>
-              <a:rPr lang="en-US" dirty="0"/>
-              <a:t> at MIT.</a:t>
-            </a:r>
-          </a:p>
-          <a:p>
-            <a:r>
-              <a:rPr lang="en-US" dirty="0"/>
-              <a:t>Syntax similar to LISP, semantics more like the </a:t>
-            </a:r>
-            <a:r>
-              <a:rPr lang="en-US" dirty="0" err="1"/>
-              <a:t>Algol</a:t>
-            </a:r>
-            <a:r>
-              <a:rPr lang="en-US" dirty="0"/>
-              <a:t> family (Pascal, </a:t>
-            </a:r>
-            <a:r>
-              <a:rPr lang="en-US" dirty="0" err="1"/>
-              <a:t>Ada</a:t>
-            </a:r>
-            <a:r>
-              <a:rPr lang="en-US" dirty="0"/>
-              <a:t>, C, Java …)</a:t>
-            </a:r>
-          </a:p>
-          <a:p>
-            <a:r>
-              <a:rPr lang="en-US" dirty="0"/>
-              <a:t>Expression-oriented and interactive (like Maple, Python, </a:t>
-            </a:r>
-            <a:r>
-              <a:rPr lang="en-US" dirty="0" err="1"/>
-              <a:t>MatLab</a:t>
-            </a:r>
-            <a:r>
-              <a:rPr lang="en-US" dirty="0"/>
-              <a:t>).</a:t>
-            </a:r>
-          </a:p>
-        </p:txBody>
-      </p:sp>
-    </p:spTree>
-  </p:cSld>
-  <p:clrMapOvr>
-    <a:masterClrMapping/>
-  </p:clrMapOvr>
-  <p:timing>
-    <p:tnLst>
-      <p:par>
-        <p:cTn id="1" dur="indefinite" restart="never" nodeType="tmRoot">
-          <p:childTnLst>
-            <p:seq concurrent="1" nextAc="seek">
-              <p:cTn id="2" dur="indefinite" nodeType="mainSeq">
-                <p:childTnLst>
-                  <p:par>
-                    <p:cTn id="3" fill="hold">
-                      <p:stCondLst>
-                        <p:cond delay="indefinite"/>
-                      </p:stCondLst>
-                      <p:childTnLst>
-                        <p:par>
-                          <p:cTn id="4" fill="hold">
-                            <p:stCondLst>
-                              <p:cond delay="0"/>
-                            </p:stCondLst>
-                            <p:childTnLst>
-                              <p:par>
-                                <p:cTn id="5" presetID="1" presetClass="entr" presetSubtype="0" fill="hold" grpId="0" nodeType="clickEffect">
-                                  <p:stCondLst>
-                                    <p:cond delay="0"/>
-                                  </p:stCondLst>
-                                  <p:childTnLst>
-                                    <p:set>
-                                      <p:cBhvr>
-                                        <p:cTn id="6" dur="1" fill="hold">
-                                          <p:stCondLst>
-                                            <p:cond delay="0"/>
-                                          </p:stCondLst>
-                                        </p:cTn>
-                                        <p:tgtEl>
-                                          <p:spTgt spid="37891">
-                                            <p:txEl>
-                                              <p:pRg st="0" end="0"/>
-                                            </p:txEl>
-                                          </p:spTgt>
-                                        </p:tgtEl>
-                                        <p:attrNameLst>
-                                          <p:attrName>style.visibility</p:attrName>
-                                        </p:attrNameLst>
-                                      </p:cBhvr>
-                                      <p:to>
-                                        <p:strVal val="visible"/>
-                                      </p:to>
-                                    </p:set>
-                                  </p:childTnLst>
-                                  <p:subTnLst>
-                                    <p:animClr clrSpc="rgb" dir="cw">
-                                      <p:cBhvr override="childStyle">
-                                        <p:cTn dur="1" fill="hold" display="0" masterRel="nextClick" afterEffect="1"/>
-                                        <p:tgtEl>
-                                          <p:spTgt spid="37891">
-                                            <p:txEl>
-                                              <p:pRg st="0" end="0"/>
-                                            </p:txEl>
-                                          </p:spTgt>
-                                        </p:tgtEl>
-                                        <p:attrNameLst>
-                                          <p:attrName>ppt_c</p:attrName>
-                                        </p:attrNameLst>
-                                      </p:cBhvr>
-                                      <p:to>
-                                        <a:schemeClr val="bg2"/>
-                                      </p:to>
-                                    </p:animClr>
-                                  </p:subTnLst>
-                                </p:cTn>
-                              </p:par>
-                            </p:childTnLst>
-                          </p:cTn>
-                        </p:par>
-                      </p:childTnLst>
-                    </p:cTn>
-                  </p:par>
-                  <p:par>
-                    <p:cTn id="7" fill="hold">
-                      <p:stCondLst>
-                        <p:cond delay="indefinite"/>
-                      </p:stCondLst>
-                      <p:childTnLst>
-                        <p:par>
-                          <p:cTn id="8" fill="hold">
-                            <p:stCondLst>
-                              <p:cond delay="0"/>
-                            </p:stCondLst>
-                            <p:childTnLst>
-                              <p:par>
-                                <p:cTn id="9" presetID="1" presetClass="entr" presetSubtype="0" fill="hold" grpId="0" nodeType="clickEffect">
-                                  <p:stCondLst>
-                                    <p:cond delay="0"/>
-                                  </p:stCondLst>
-                                  <p:childTnLst>
-                                    <p:set>
-                                      <p:cBhvr>
-                                        <p:cTn id="10" dur="1" fill="hold">
-                                          <p:stCondLst>
-                                            <p:cond delay="0"/>
-                                          </p:stCondLst>
-                                        </p:cTn>
-                                        <p:tgtEl>
-                                          <p:spTgt spid="37891">
-                                            <p:txEl>
-                                              <p:pRg st="1" end="1"/>
-                                            </p:txEl>
-                                          </p:spTgt>
-                                        </p:tgtEl>
-                                        <p:attrNameLst>
-                                          <p:attrName>style.visibility</p:attrName>
-                                        </p:attrNameLst>
-                                      </p:cBhvr>
-                                      <p:to>
-                                        <p:strVal val="visible"/>
-                                      </p:to>
-                                    </p:set>
-                                  </p:childTnLst>
-                                  <p:subTnLst>
-                                    <p:animClr clrSpc="rgb" dir="cw">
-                                      <p:cBhvr override="childStyle">
-                                        <p:cTn dur="1" fill="hold" display="0" masterRel="nextClick" afterEffect="1"/>
-                                        <p:tgtEl>
-                                          <p:spTgt spid="37891">
-                                            <p:txEl>
-                                              <p:pRg st="1" end="1"/>
-                                            </p:txEl>
-                                          </p:spTgt>
-                                        </p:tgtEl>
-                                        <p:attrNameLst>
-                                          <p:attrName>ppt_c</p:attrName>
-                                        </p:attrNameLst>
-                                      </p:cBhvr>
-                                      <p:to>
-                                        <a:schemeClr val="bg2"/>
-                                      </p:to>
-                                    </p:animClr>
-                                  </p:subTnLst>
-                                </p:cTn>
-                              </p:par>
-                            </p:childTnLst>
-                          </p:cTn>
-                        </p:par>
-                      </p:childTnLst>
-                    </p:cTn>
-                  </p:par>
-                  <p:par>
-                    <p:cTn id="11" fill="hold">
-                      <p:stCondLst>
-                        <p:cond delay="indefinite"/>
-                      </p:stCondLst>
-                      <p:childTnLst>
-                        <p:par>
-                          <p:cTn id="12" fill="hold">
-                            <p:stCondLst>
-                              <p:cond delay="0"/>
-                            </p:stCondLst>
-                            <p:childTnLst>
-                              <p:par>
-                                <p:cTn id="13" presetID="1" presetClass="entr" presetSubtype="0" fill="hold" grpId="0" nodeType="clickEffect">
-                                  <p:stCondLst>
-                                    <p:cond delay="0"/>
-                                  </p:stCondLst>
-                                  <p:childTnLst>
-                                    <p:set>
-                                      <p:cBhvr>
-                                        <p:cTn id="14" dur="1" fill="hold">
-                                          <p:stCondLst>
-                                            <p:cond delay="0"/>
-                                          </p:stCondLst>
-                                        </p:cTn>
-                                        <p:tgtEl>
-                                          <p:spTgt spid="37891">
-                                            <p:txEl>
-                                              <p:pRg st="2" end="2"/>
-                                            </p:txEl>
-                                          </p:spTgt>
-                                        </p:tgtEl>
-                                        <p:attrNameLst>
-                                          <p:attrName>style.visibility</p:attrName>
-                                        </p:attrNameLst>
-                                      </p:cBhvr>
-                                      <p:to>
-                                        <p:strVal val="visible"/>
-                                      </p:to>
-                                    </p:set>
-                                  </p:childTnLst>
-                                  <p:subTnLst>
-                                    <p:animClr clrSpc="rgb" dir="cw">
-                                      <p:cBhvr override="childStyle">
-                                        <p:cTn dur="1" fill="hold" display="0" masterRel="nextClick" afterEffect="1"/>
-                                        <p:tgtEl>
-                                          <p:spTgt spid="37891">
-                                            <p:txEl>
-                                              <p:pRg st="2" end="2"/>
-                                            </p:txEl>
-                                          </p:spTgt>
-                                        </p:tgtEl>
-                                        <p:attrNameLst>
-                                          <p:attrName>ppt_c</p:attrName>
-                                        </p:attrNameLst>
-                                      </p:cBhvr>
-                                      <p:to>
-                                        <a:schemeClr val="bg2"/>
-                                      </p:to>
-                                    </p:animClr>
-                                  </p:subTnLst>
-                                </p:cTn>
-                              </p:par>
-                            </p:childTnLst>
-                          </p:cTn>
-                        </p:par>
-                      </p:childTnLst>
-                    </p:cTn>
-                  </p:par>
-                </p:childTnLst>
-              </p:cTn>
-              <p:prevCondLst>
-                <p:cond evt="onPrev" delay="0">
-                  <p:tgtEl>
-                    <p:sldTgt/>
-                  </p:tgtEl>
-                </p:cond>
-              </p:prevCondLst>
-              <p:nextCondLst>
-                <p:cond evt="onNext" delay="0">
-                  <p:tgtEl>
-                    <p:sldTgt/>
-                  </p:tgtEl>
-                </p:cond>
-              </p:nextCondLst>
-            </p:seq>
-          </p:childTnLst>
-        </p:cTn>
-      </p:par>
-    </p:tnLst>
-    <p:bldLst>
-      <p:bldP spid="37891" grpId="0" build="p"/>
-    </p:bldLst>
-  </p:timing>
 </p:sld>
 </file>
 

</xml_diff>